<commit_message>
Made one more change on the powerpoint presentation
</commit_message>
<xml_diff>
--- a/PowerPoint/How to make an app for Zendesk.pptx
+++ b/PowerPoint/How to make an app for Zendesk.pptx
@@ -303,7 +303,7 @@
           <a:p>
             <a:fld id="{375F6C9A-6E03-496A-B33C-ADF31287976E}" type="datetimeFigureOut">
               <a:rPr lang="en-US" smtClean="0"/>
-              <a:t>4/22/2013</a:t>
+              <a:t>4/30/2013</a:t>
             </a:fld>
             <a:endParaRPr lang="en-US"/>
           </a:p>
@@ -473,7 +473,7 @@
           <a:p>
             <a:fld id="{375F6C9A-6E03-496A-B33C-ADF31287976E}" type="datetimeFigureOut">
               <a:rPr lang="en-US" smtClean="0"/>
-              <a:t>4/22/2013</a:t>
+              <a:t>4/30/2013</a:t>
             </a:fld>
             <a:endParaRPr lang="en-US"/>
           </a:p>
@@ -653,7 +653,7 @@
           <a:p>
             <a:fld id="{375F6C9A-6E03-496A-B33C-ADF31287976E}" type="datetimeFigureOut">
               <a:rPr lang="en-US" smtClean="0"/>
-              <a:t>4/22/2013</a:t>
+              <a:t>4/30/2013</a:t>
             </a:fld>
             <a:endParaRPr lang="en-US"/>
           </a:p>
@@ -823,7 +823,7 @@
           <a:p>
             <a:fld id="{375F6C9A-6E03-496A-B33C-ADF31287976E}" type="datetimeFigureOut">
               <a:rPr lang="en-US" smtClean="0"/>
-              <a:t>4/22/2013</a:t>
+              <a:t>4/30/2013</a:t>
             </a:fld>
             <a:endParaRPr lang="en-US"/>
           </a:p>
@@ -1069,7 +1069,7 @@
           <a:p>
             <a:fld id="{375F6C9A-6E03-496A-B33C-ADF31287976E}" type="datetimeFigureOut">
               <a:rPr lang="en-US" smtClean="0"/>
-              <a:t>4/22/2013</a:t>
+              <a:t>4/30/2013</a:t>
             </a:fld>
             <a:endParaRPr lang="en-US"/>
           </a:p>
@@ -1357,7 +1357,7 @@
           <a:p>
             <a:fld id="{375F6C9A-6E03-496A-B33C-ADF31287976E}" type="datetimeFigureOut">
               <a:rPr lang="en-US" smtClean="0"/>
-              <a:t>4/22/2013</a:t>
+              <a:t>4/30/2013</a:t>
             </a:fld>
             <a:endParaRPr lang="en-US"/>
           </a:p>
@@ -1779,7 +1779,7 @@
           <a:p>
             <a:fld id="{375F6C9A-6E03-496A-B33C-ADF31287976E}" type="datetimeFigureOut">
               <a:rPr lang="en-US" smtClean="0"/>
-              <a:t>4/22/2013</a:t>
+              <a:t>4/30/2013</a:t>
             </a:fld>
             <a:endParaRPr lang="en-US"/>
           </a:p>
@@ -1897,7 +1897,7 @@
           <a:p>
             <a:fld id="{375F6C9A-6E03-496A-B33C-ADF31287976E}" type="datetimeFigureOut">
               <a:rPr lang="en-US" smtClean="0"/>
-              <a:t>4/22/2013</a:t>
+              <a:t>4/30/2013</a:t>
             </a:fld>
             <a:endParaRPr lang="en-US"/>
           </a:p>
@@ -1992,7 +1992,7 @@
           <a:p>
             <a:fld id="{375F6C9A-6E03-496A-B33C-ADF31287976E}" type="datetimeFigureOut">
               <a:rPr lang="en-US" smtClean="0"/>
-              <a:t>4/22/2013</a:t>
+              <a:t>4/30/2013</a:t>
             </a:fld>
             <a:endParaRPr lang="en-US"/>
           </a:p>
@@ -2269,7 +2269,7 @@
           <a:p>
             <a:fld id="{375F6C9A-6E03-496A-B33C-ADF31287976E}" type="datetimeFigureOut">
               <a:rPr lang="en-US" smtClean="0"/>
-              <a:t>4/22/2013</a:t>
+              <a:t>4/30/2013</a:t>
             </a:fld>
             <a:endParaRPr lang="en-US"/>
           </a:p>
@@ -2522,7 +2522,7 @@
           <a:p>
             <a:fld id="{375F6C9A-6E03-496A-B33C-ADF31287976E}" type="datetimeFigureOut">
               <a:rPr lang="en-US" smtClean="0"/>
-              <a:t>4/22/2013</a:t>
+              <a:t>4/30/2013</a:t>
             </a:fld>
             <a:endParaRPr lang="en-US"/>
           </a:p>
@@ -2735,7 +2735,7 @@
           <a:p>
             <a:fld id="{375F6C9A-6E03-496A-B33C-ADF31287976E}" type="datetimeFigureOut">
               <a:rPr lang="en-US" smtClean="0"/>
-              <a:t>4/22/2013</a:t>
+              <a:t>4/30/2013</a:t>
             </a:fld>
             <a:endParaRPr lang="en-US"/>
           </a:p>
@@ -3127,7 +3127,15 @@
           <a:p>
             <a:r>
               <a:rPr lang="en-US" dirty="0" smtClean="0"/>
-              <a:t>How to make an app for Zendesk API v 2</a:t>
+              <a:t>How to make an app </a:t>
+            </a:r>
+            <a:r>
+              <a:rPr lang="en-US" smtClean="0"/>
+              <a:t>for </a:t>
+            </a:r>
+            <a:r>
+              <a:rPr lang="en-US" smtClean="0"/>
+              <a:t>Zendesk</a:t>
             </a:r>
             <a:endParaRPr lang="en-US" dirty="0"/>
           </a:p>

</xml_diff>

<commit_message>
Added audio and new slides in the powerpoint prensentation
</commit_message>
<xml_diff>
--- a/PowerPoint/How to make an app for Zendesk.pptx
+++ b/PowerPoint/How to make an app for Zendesk.pptx
@@ -9,18 +9,22 @@
     <p:sldId id="257" r:id="rId3"/>
     <p:sldId id="258" r:id="rId4"/>
     <p:sldId id="262" r:id="rId5"/>
-    <p:sldId id="269" r:id="rId6"/>
-    <p:sldId id="270" r:id="rId7"/>
-    <p:sldId id="259" r:id="rId8"/>
-    <p:sldId id="260" r:id="rId9"/>
-    <p:sldId id="261" r:id="rId10"/>
-    <p:sldId id="263" r:id="rId11"/>
-    <p:sldId id="264" r:id="rId12"/>
-    <p:sldId id="265" r:id="rId13"/>
-    <p:sldId id="272" r:id="rId14"/>
-    <p:sldId id="267" r:id="rId15"/>
-    <p:sldId id="266" r:id="rId16"/>
-    <p:sldId id="268" r:id="rId17"/>
+    <p:sldId id="277" r:id="rId6"/>
+    <p:sldId id="274" r:id="rId7"/>
+    <p:sldId id="275" r:id="rId8"/>
+    <p:sldId id="276" r:id="rId9"/>
+    <p:sldId id="269" r:id="rId10"/>
+    <p:sldId id="270" r:id="rId11"/>
+    <p:sldId id="259" r:id="rId12"/>
+    <p:sldId id="260" r:id="rId13"/>
+    <p:sldId id="261" r:id="rId14"/>
+    <p:sldId id="263" r:id="rId15"/>
+    <p:sldId id="264" r:id="rId16"/>
+    <p:sldId id="265" r:id="rId17"/>
+    <p:sldId id="272" r:id="rId18"/>
+    <p:sldId id="267" r:id="rId19"/>
+    <p:sldId id="266" r:id="rId20"/>
+    <p:sldId id="268" r:id="rId21"/>
   </p:sldIdLst>
   <p:sldSz cx="9144000" cy="6858000" type="screen4x3"/>
   <p:notesSz cx="6858000" cy="9144000"/>
@@ -3127,14 +3131,10 @@
           <a:p>
             <a:r>
               <a:rPr lang="en-US" dirty="0" smtClean="0"/>
-              <a:t>How to make an app </a:t>
-            </a:r>
-            <a:r>
-              <a:rPr lang="en-US" smtClean="0"/>
-              <a:t>for </a:t>
-            </a:r>
-            <a:r>
-              <a:rPr lang="en-US" smtClean="0"/>
+              <a:t>How to make an app for </a:t>
+            </a:r>
+            <a:r>
+              <a:rPr lang="en-US" dirty="0" smtClean="0"/>
               <a:t>Zendesk</a:t>
             </a:r>
             <a:endParaRPr lang="en-US" dirty="0"/>
@@ -3203,6 +3203,448 @@
 </file>
 
 <file path=ppt/slides/slide10.xml><?xml version="1.0" encoding="utf-8"?>
+<p:sld xmlns:a="http://schemas.openxmlformats.org/drawingml/2006/main" xmlns:r="http://schemas.openxmlformats.org/officeDocument/2006/relationships" xmlns:p="http://schemas.openxmlformats.org/presentationml/2006/main">
+  <p:cSld>
+    <p:spTree>
+      <p:nvGrpSpPr>
+        <p:cNvPr id="1" name=""/>
+        <p:cNvGrpSpPr/>
+        <p:nvPr/>
+      </p:nvGrpSpPr>
+      <p:grpSpPr>
+        <a:xfrm>
+          <a:off x="0" y="0"/>
+          <a:ext cx="0" cy="0"/>
+          <a:chOff x="0" y="0"/>
+          <a:chExt cx="0" cy="0"/>
+        </a:xfrm>
+      </p:grpSpPr>
+      <p:sp>
+        <p:nvSpPr>
+          <p:cNvPr id="2" name="TextBox 1"/>
+          <p:cNvSpPr txBox="1"/>
+          <p:nvPr/>
+        </p:nvSpPr>
+        <p:spPr>
+          <a:xfrm>
+            <a:off x="631371" y="6019800"/>
+            <a:ext cx="8097666" cy="646331"/>
+          </a:xfrm>
+          <a:prstGeom prst="rect">
+            <a:avLst/>
+          </a:prstGeom>
+          <a:noFill/>
+        </p:spPr>
+        <p:txBody>
+          <a:bodyPr wrap="none" rtlCol="0">
+            <a:spAutoFit/>
+          </a:bodyPr>
+          <a:lstStyle/>
+          <a:p>
+            <a:pPr marL="342900" indent="-342900">
+              <a:buFont typeface="+mj-lt"/>
+              <a:buAutoNum type="arabicPeriod"/>
+            </a:pPr>
+            <a:r>
+              <a:rPr lang="en-US" dirty="0"/>
+              <a:t>http://developer.zendesk.com/documentation/apps/migration/introduction.html</a:t>
+            </a:r>
+          </a:p>
+          <a:p>
+            <a:pPr marL="342900" indent="-342900">
+              <a:buFont typeface="+mj-lt"/>
+              <a:buAutoNum type="arabicPeriod"/>
+            </a:pPr>
+            <a:r>
+              <a:rPr lang="en-US" dirty="0" smtClean="0"/>
+              <a:t>http</a:t>
+            </a:r>
+            <a:r>
+              <a:rPr lang="en-US" dirty="0"/>
+              <a:t>://developer.zendesk.com/documentation/apps/</a:t>
+            </a:r>
+          </a:p>
+        </p:txBody>
+      </p:sp>
+      <p:pic>
+        <p:nvPicPr>
+          <p:cNvPr id="2050" name="Picture 2" descr="C:\Users\jortiz\AppData\Local\Microsoft\Windows\Temporary Internet Files\Content.IE5\JUTGQLI2\MP900399580[1].jpg"/>
+          <p:cNvPicPr>
+            <a:picLocks noChangeAspect="1" noChangeArrowheads="1"/>
+          </p:cNvPicPr>
+          <p:nvPr/>
+        </p:nvPicPr>
+        <p:blipFill>
+          <a:blip r:embed="rId2">
+            <a:extLst>
+              <a:ext uri="{28A0092B-C50C-407E-A947-70E740481C1C}">
+                <a14:useLocalDpi xmlns:a14="http://schemas.microsoft.com/office/drawing/2010/main" val="0"/>
+              </a:ext>
+            </a:extLst>
+          </a:blip>
+          <a:srcRect/>
+          <a:stretch>
+            <a:fillRect/>
+          </a:stretch>
+        </p:blipFill>
+        <p:spPr bwMode="auto">
+          <a:xfrm>
+            <a:off x="2362200" y="609600"/>
+            <a:ext cx="4094162" cy="5119001"/>
+          </a:xfrm>
+          <a:prstGeom prst="rect">
+            <a:avLst/>
+          </a:prstGeom>
+          <a:noFill/>
+          <a:extLst>
+            <a:ext uri="{909E8E84-426E-40DD-AFC4-6F175D3DCCD1}">
+              <a14:hiddenFill xmlns:a14="http://schemas.microsoft.com/office/drawing/2010/main">
+                <a:solidFill>
+                  <a:srgbClr val="FFFFFF"/>
+                </a:solidFill>
+              </a14:hiddenFill>
+            </a:ext>
+          </a:extLst>
+        </p:spPr>
+      </p:pic>
+    </p:spTree>
+    <p:extLst>
+      <p:ext uri="{BB962C8B-B14F-4D97-AF65-F5344CB8AC3E}">
+        <p14:creationId xmlns:p14="http://schemas.microsoft.com/office/powerpoint/2010/main" val="2701134517"/>
+      </p:ext>
+    </p:extLst>
+  </p:cSld>
+  <p:clrMapOvr>
+    <a:masterClrMapping/>
+  </p:clrMapOvr>
+  <p:timing>
+    <p:tnLst>
+      <p:par>
+        <p:cTn id="1" dur="indefinite" restart="never" nodeType="tmRoot"/>
+      </p:par>
+    </p:tnLst>
+  </p:timing>
+</p:sld>
+</file>
+
+<file path=ppt/slides/slide11.xml><?xml version="1.0" encoding="utf-8"?>
+<p:sld xmlns:a="http://schemas.openxmlformats.org/drawingml/2006/main" xmlns:r="http://schemas.openxmlformats.org/officeDocument/2006/relationships" xmlns:p="http://schemas.openxmlformats.org/presentationml/2006/main">
+  <p:cSld>
+    <p:spTree>
+      <p:nvGrpSpPr>
+        <p:cNvPr id="1" name=""/>
+        <p:cNvGrpSpPr/>
+        <p:nvPr/>
+      </p:nvGrpSpPr>
+      <p:grpSpPr>
+        <a:xfrm>
+          <a:off x="0" y="0"/>
+          <a:ext cx="0" cy="0"/>
+          <a:chOff x="0" y="0"/>
+          <a:chExt cx="0" cy="0"/>
+        </a:xfrm>
+      </p:grpSpPr>
+      <p:pic>
+        <p:nvPicPr>
+          <p:cNvPr id="3075" name="Picture 3"/>
+          <p:cNvPicPr>
+            <a:picLocks noChangeAspect="1" noChangeArrowheads="1"/>
+          </p:cNvPicPr>
+          <p:nvPr/>
+        </p:nvPicPr>
+        <p:blipFill>
+          <a:blip r:embed="rId2">
+            <a:extLst>
+              <a:ext uri="{28A0092B-C50C-407E-A947-70E740481C1C}">
+                <a14:useLocalDpi xmlns:a14="http://schemas.microsoft.com/office/drawing/2010/main" val="0"/>
+              </a:ext>
+            </a:extLst>
+          </a:blip>
+          <a:srcRect/>
+          <a:stretch>
+            <a:fillRect/>
+          </a:stretch>
+        </p:blipFill>
+        <p:spPr bwMode="auto">
+          <a:xfrm>
+            <a:off x="147862" y="1371600"/>
+            <a:ext cx="8824913" cy="3327400"/>
+          </a:xfrm>
+          <a:prstGeom prst="rect">
+            <a:avLst/>
+          </a:prstGeom>
+          <a:ln/>
+        </p:spPr>
+        <p:style>
+          <a:lnRef idx="1">
+            <a:schemeClr val="accent3"/>
+          </a:lnRef>
+          <a:fillRef idx="2">
+            <a:schemeClr val="accent3"/>
+          </a:fillRef>
+          <a:effectRef idx="1">
+            <a:schemeClr val="accent3"/>
+          </a:effectRef>
+          <a:fontRef idx="minor">
+            <a:schemeClr val="dk1"/>
+          </a:fontRef>
+        </p:style>
+      </p:pic>
+    </p:spTree>
+    <p:extLst>
+      <p:ext uri="{BB962C8B-B14F-4D97-AF65-F5344CB8AC3E}">
+        <p14:creationId xmlns:p14="http://schemas.microsoft.com/office/powerpoint/2010/main" val="1790645398"/>
+      </p:ext>
+    </p:extLst>
+  </p:cSld>
+  <p:clrMapOvr>
+    <a:masterClrMapping/>
+  </p:clrMapOvr>
+  <p:timing>
+    <p:tnLst>
+      <p:par>
+        <p:cTn id="1" dur="indefinite" restart="never" nodeType="tmRoot"/>
+      </p:par>
+    </p:tnLst>
+  </p:timing>
+</p:sld>
+</file>
+
+<file path=ppt/slides/slide12.xml><?xml version="1.0" encoding="utf-8"?>
+<p:sld xmlns:a="http://schemas.openxmlformats.org/drawingml/2006/main" xmlns:r="http://schemas.openxmlformats.org/officeDocument/2006/relationships" xmlns:p="http://schemas.openxmlformats.org/presentationml/2006/main">
+  <p:cSld>
+    <p:spTree>
+      <p:nvGrpSpPr>
+        <p:cNvPr id="1" name=""/>
+        <p:cNvGrpSpPr/>
+        <p:nvPr/>
+      </p:nvGrpSpPr>
+      <p:grpSpPr>
+        <a:xfrm>
+          <a:off x="0" y="0"/>
+          <a:ext cx="0" cy="0"/>
+          <a:chOff x="0" y="0"/>
+          <a:chExt cx="0" cy="0"/>
+        </a:xfrm>
+      </p:grpSpPr>
+      <p:pic>
+        <p:nvPicPr>
+          <p:cNvPr id="4098" name="Picture 2"/>
+          <p:cNvPicPr>
+            <a:picLocks noChangeAspect="1" noChangeArrowheads="1"/>
+          </p:cNvPicPr>
+          <p:nvPr/>
+        </p:nvPicPr>
+        <p:blipFill>
+          <a:blip r:embed="rId2">
+            <a:extLst>
+              <a:ext uri="{28A0092B-C50C-407E-A947-70E740481C1C}">
+                <a14:useLocalDpi xmlns:a14="http://schemas.microsoft.com/office/drawing/2010/main" val="0"/>
+              </a:ext>
+            </a:extLst>
+          </a:blip>
+          <a:srcRect/>
+          <a:stretch>
+            <a:fillRect/>
+          </a:stretch>
+        </p:blipFill>
+        <p:spPr bwMode="auto">
+          <a:xfrm>
+            <a:off x="550636" y="859971"/>
+            <a:ext cx="7910513" cy="1816100"/>
+          </a:xfrm>
+          <a:prstGeom prst="rect">
+            <a:avLst/>
+          </a:prstGeom>
+          <a:ln/>
+        </p:spPr>
+        <p:style>
+          <a:lnRef idx="3">
+            <a:schemeClr val="lt1"/>
+          </a:lnRef>
+          <a:fillRef idx="1">
+            <a:schemeClr val="accent5"/>
+          </a:fillRef>
+          <a:effectRef idx="1">
+            <a:schemeClr val="accent5"/>
+          </a:effectRef>
+          <a:fontRef idx="minor">
+            <a:schemeClr val="lt1"/>
+          </a:fontRef>
+        </p:style>
+      </p:pic>
+      <p:sp>
+        <p:nvSpPr>
+          <p:cNvPr id="4" name="TextBox 3"/>
+          <p:cNvSpPr txBox="1"/>
+          <p:nvPr/>
+        </p:nvSpPr>
+        <p:spPr>
+          <a:xfrm>
+            <a:off x="550636" y="2306739"/>
+            <a:ext cx="7086600" cy="369332"/>
+          </a:xfrm>
+          <a:prstGeom prst="rect">
+            <a:avLst/>
+          </a:prstGeom>
+          <a:noFill/>
+        </p:spPr>
+        <p:txBody>
+          <a:bodyPr wrap="square" rtlCol="0">
+            <a:spAutoFit/>
+          </a:bodyPr>
+          <a:lstStyle/>
+          <a:p>
+            <a:r>
+              <a:rPr lang="en-US" dirty="0" smtClean="0"/>
+              <a:t>Inside of templates folder</a:t>
+            </a:r>
+            <a:endParaRPr lang="en-US" dirty="0"/>
+          </a:p>
+        </p:txBody>
+      </p:sp>
+    </p:spTree>
+    <p:extLst>
+      <p:ext uri="{BB962C8B-B14F-4D97-AF65-F5344CB8AC3E}">
+        <p14:creationId xmlns:p14="http://schemas.microsoft.com/office/powerpoint/2010/main" val="1311630102"/>
+      </p:ext>
+    </p:extLst>
+  </p:cSld>
+  <p:clrMapOvr>
+    <a:masterClrMapping/>
+  </p:clrMapOvr>
+  <p:timing>
+    <p:tnLst>
+      <p:par>
+        <p:cTn id="1" dur="indefinite" restart="never" nodeType="tmRoot"/>
+      </p:par>
+    </p:tnLst>
+  </p:timing>
+</p:sld>
+</file>
+
+<file path=ppt/slides/slide13.xml><?xml version="1.0" encoding="utf-8"?>
+<p:sld xmlns:a="http://schemas.openxmlformats.org/drawingml/2006/main" xmlns:r="http://schemas.openxmlformats.org/officeDocument/2006/relationships" xmlns:p="http://schemas.openxmlformats.org/presentationml/2006/main">
+  <p:cSld>
+    <p:spTree>
+      <p:nvGrpSpPr>
+        <p:cNvPr id="1" name=""/>
+        <p:cNvGrpSpPr/>
+        <p:nvPr/>
+      </p:nvGrpSpPr>
+      <p:grpSpPr>
+        <a:xfrm>
+          <a:off x="0" y="0"/>
+          <a:ext cx="0" cy="0"/>
+          <a:chOff x="0" y="0"/>
+          <a:chExt cx="0" cy="0"/>
+        </a:xfrm>
+      </p:grpSpPr>
+      <p:pic>
+        <p:nvPicPr>
+          <p:cNvPr id="6146" name="Picture 2"/>
+          <p:cNvPicPr>
+            <a:picLocks noChangeAspect="1" noChangeArrowheads="1"/>
+          </p:cNvPicPr>
+          <p:nvPr/>
+        </p:nvPicPr>
+        <p:blipFill>
+          <a:blip r:embed="rId2">
+            <a:extLst>
+              <a:ext uri="{28A0092B-C50C-407E-A947-70E740481C1C}">
+                <a14:useLocalDpi xmlns:a14="http://schemas.microsoft.com/office/drawing/2010/main" val="0"/>
+              </a:ext>
+            </a:extLst>
+          </a:blip>
+          <a:srcRect/>
+          <a:stretch>
+            <a:fillRect/>
+          </a:stretch>
+        </p:blipFill>
+        <p:spPr bwMode="auto">
+          <a:xfrm>
+            <a:off x="431800" y="381000"/>
+            <a:ext cx="8278813" cy="3898900"/>
+          </a:xfrm>
+          <a:prstGeom prst="rect">
+            <a:avLst/>
+          </a:prstGeom>
+          <a:noFill/>
+          <a:ln>
+            <a:noFill/>
+          </a:ln>
+          <a:extLst>
+            <a:ext uri="{909E8E84-426E-40DD-AFC4-6F175D3DCCD1}">
+              <a14:hiddenFill xmlns:a14="http://schemas.microsoft.com/office/drawing/2010/main">
+                <a:solidFill>
+                  <a:schemeClr val="accent1"/>
+                </a:solidFill>
+              </a14:hiddenFill>
+            </a:ext>
+            <a:ext uri="{91240B29-F687-4F45-9708-019B960494DF}">
+              <a14:hiddenLine xmlns:a14="http://schemas.microsoft.com/office/drawing/2010/main" w="9525">
+                <a:solidFill>
+                  <a:schemeClr val="tx1"/>
+                </a:solidFill>
+                <a:miter lim="800000"/>
+                <a:headEnd/>
+                <a:tailEnd/>
+              </a14:hiddenLine>
+            </a:ext>
+          </a:extLst>
+        </p:spPr>
+      </p:pic>
+      <p:sp>
+        <p:nvSpPr>
+          <p:cNvPr id="2" name="TextBox 1"/>
+          <p:cNvSpPr txBox="1"/>
+          <p:nvPr/>
+        </p:nvSpPr>
+        <p:spPr>
+          <a:xfrm>
+            <a:off x="1219200" y="2743200"/>
+            <a:ext cx="4267200" cy="369332"/>
+          </a:xfrm>
+          <a:prstGeom prst="rect">
+            <a:avLst/>
+          </a:prstGeom>
+          <a:noFill/>
+        </p:spPr>
+        <p:txBody>
+          <a:bodyPr wrap="square" rtlCol="0">
+            <a:spAutoFit/>
+          </a:bodyPr>
+          <a:lstStyle/>
+          <a:p>
+            <a:r>
+              <a:rPr lang="en-US" dirty="0" smtClean="0"/>
+              <a:t>Inside the assets folder</a:t>
+            </a:r>
+            <a:endParaRPr lang="en-US" dirty="0"/>
+          </a:p>
+        </p:txBody>
+      </p:sp>
+    </p:spTree>
+    <p:extLst>
+      <p:ext uri="{BB962C8B-B14F-4D97-AF65-F5344CB8AC3E}">
+        <p14:creationId xmlns:p14="http://schemas.microsoft.com/office/powerpoint/2010/main" val="3318644273"/>
+      </p:ext>
+    </p:extLst>
+  </p:cSld>
+  <p:clrMapOvr>
+    <a:masterClrMapping/>
+  </p:clrMapOvr>
+  <p:timing>
+    <p:tnLst>
+      <p:par>
+        <p:cTn id="1" dur="indefinite" restart="never" nodeType="tmRoot"/>
+      </p:par>
+    </p:tnLst>
+  </p:timing>
+</p:sld>
+</file>
+
+<file path=ppt/slides/slide14.xml><?xml version="1.0" encoding="utf-8"?>
 <p:sld xmlns:a="http://schemas.openxmlformats.org/drawingml/2006/main" xmlns:r="http://schemas.openxmlformats.org/officeDocument/2006/relationships" xmlns:p="http://schemas.openxmlformats.org/presentationml/2006/main">
   <p:cSld>
     <p:spTree>
@@ -3323,7 +3765,7 @@
 </p:sld>
 </file>
 
-<file path=ppt/slides/slide11.xml><?xml version="1.0" encoding="utf-8"?>
+<file path=ppt/slides/slide15.xml><?xml version="1.0" encoding="utf-8"?>
 <p:sld xmlns:a="http://schemas.openxmlformats.org/drawingml/2006/main" xmlns:r="http://schemas.openxmlformats.org/officeDocument/2006/relationships" xmlns:p="http://schemas.openxmlformats.org/presentationml/2006/main">
   <p:cSld>
     <p:spTree>
@@ -3804,7 +4246,7 @@
 </p:sld>
 </file>
 
-<file path=ppt/slides/slide12.xml><?xml version="1.0" encoding="utf-8"?>
+<file path=ppt/slides/slide16.xml><?xml version="1.0" encoding="utf-8"?>
 <p:sld xmlns:a="http://schemas.openxmlformats.org/drawingml/2006/main" xmlns:r="http://schemas.openxmlformats.org/officeDocument/2006/relationships" xmlns:p="http://schemas.openxmlformats.org/presentationml/2006/main">
   <p:cSld>
     <p:spTree>
@@ -4442,7 +4884,7 @@
 </p:sld>
 </file>
 
-<file path=ppt/slides/slide13.xml><?xml version="1.0" encoding="utf-8"?>
+<file path=ppt/slides/slide17.xml><?xml version="1.0" encoding="utf-8"?>
 <p:sld xmlns:a="http://schemas.openxmlformats.org/drawingml/2006/main" xmlns:r="http://schemas.openxmlformats.org/officeDocument/2006/relationships" xmlns:p="http://schemas.openxmlformats.org/presentationml/2006/main">
   <p:cSld>
     <p:spTree>
@@ -4625,7 +5067,7 @@
 </p:sld>
 </file>
 
-<file path=ppt/slides/slide14.xml><?xml version="1.0" encoding="utf-8"?>
+<file path=ppt/slides/slide18.xml><?xml version="1.0" encoding="utf-8"?>
 <p:sld xmlns:a="http://schemas.openxmlformats.org/drawingml/2006/main" xmlns:r="http://schemas.openxmlformats.org/officeDocument/2006/relationships" xmlns:p="http://schemas.openxmlformats.org/presentationml/2006/main">
   <p:cSld>
     <p:spTree>
@@ -7676,7 +8118,7 @@
 </p:sld>
 </file>
 
-<file path=ppt/slides/slide15.xml><?xml version="1.0" encoding="utf-8"?>
+<file path=ppt/slides/slide19.xml><?xml version="1.0" encoding="utf-8"?>
 <p:sld xmlns:a="http://schemas.openxmlformats.org/drawingml/2006/main" xmlns:r="http://schemas.openxmlformats.org/officeDocument/2006/relationships" xmlns:p="http://schemas.openxmlformats.org/presentationml/2006/main">
   <p:cSld>
     <p:spTree>
@@ -7985,93 +8427,6 @@
       </p:par>
     </p:tnLst>
   </p:timing>
-</p:sld>
-</file>
-
-<file path=ppt/slides/slide16.xml><?xml version="1.0" encoding="utf-8"?>
-<p:sld xmlns:a="http://schemas.openxmlformats.org/drawingml/2006/main" xmlns:r="http://schemas.openxmlformats.org/officeDocument/2006/relationships" xmlns:p="http://schemas.openxmlformats.org/presentationml/2006/main">
-  <p:cSld>
-    <p:spTree>
-      <p:nvGrpSpPr>
-        <p:cNvPr id="1" name=""/>
-        <p:cNvGrpSpPr/>
-        <p:nvPr/>
-      </p:nvGrpSpPr>
-      <p:grpSpPr>
-        <a:xfrm>
-          <a:off x="0" y="0"/>
-          <a:ext cx="0" cy="0"/>
-          <a:chOff x="0" y="0"/>
-          <a:chExt cx="0" cy="0"/>
-        </a:xfrm>
-      </p:grpSpPr>
-      <p:sp>
-        <p:nvSpPr>
-          <p:cNvPr id="2" name="Title 1"/>
-          <p:cNvSpPr>
-            <a:spLocks noGrp="1"/>
-          </p:cNvSpPr>
-          <p:nvPr>
-            <p:ph type="title"/>
-          </p:nvPr>
-        </p:nvSpPr>
-        <p:spPr/>
-        <p:txBody>
-          <a:bodyPr/>
-          <a:lstStyle/>
-          <a:p>
-            <a:r>
-              <a:rPr lang="en-US" dirty="0" err="1" smtClean="0"/>
-              <a:t>Github</a:t>
-            </a:r>
-            <a:r>
-              <a:rPr lang="en-US" dirty="0" smtClean="0"/>
-              <a:t> Repository</a:t>
-            </a:r>
-            <a:endParaRPr lang="en-US" dirty="0"/>
-          </a:p>
-        </p:txBody>
-      </p:sp>
-      <p:sp>
-        <p:nvSpPr>
-          <p:cNvPr id="3" name="Content Placeholder 2"/>
-          <p:cNvSpPr>
-            <a:spLocks noGrp="1"/>
-          </p:cNvSpPr>
-          <p:nvPr>
-            <p:ph idx="1"/>
-          </p:nvPr>
-        </p:nvSpPr>
-        <p:spPr>
-          <a:xfrm>
-            <a:off x="457200" y="1600201"/>
-            <a:ext cx="8229600" cy="762000"/>
-          </a:xfrm>
-        </p:spPr>
-        <p:txBody>
-          <a:bodyPr/>
-          <a:lstStyle/>
-          <a:p>
-            <a:pPr marL="0" indent="0">
-              <a:buNone/>
-            </a:pPr>
-            <a:r>
-              <a:rPr lang="en-US" dirty="0"/>
-              <a:t>https://github.com/wayko/ZendeskApp.git</a:t>
-            </a:r>
-          </a:p>
-        </p:txBody>
-      </p:sp>
-    </p:spTree>
-    <p:extLst>
-      <p:ext uri="{BB962C8B-B14F-4D97-AF65-F5344CB8AC3E}">
-        <p14:creationId xmlns:p14="http://schemas.microsoft.com/office/powerpoint/2010/main" val="1950768299"/>
-      </p:ext>
-    </p:extLst>
-  </p:cSld>
-  <p:clrMapOvr>
-    <a:masterClrMapping/>
-  </p:clrMapOvr>
 </p:sld>
 </file>
 
@@ -8183,6 +8538,100 @@
     <p:extLst>
       <p:ext uri="{BB962C8B-B14F-4D97-AF65-F5344CB8AC3E}">
         <p14:creationId xmlns:p14="http://schemas.microsoft.com/office/powerpoint/2010/main" val="2176737412"/>
+      </p:ext>
+    </p:extLst>
+  </p:cSld>
+  <p:clrMapOvr>
+    <a:masterClrMapping/>
+  </p:clrMapOvr>
+  <p:timing>
+    <p:tnLst>
+      <p:par>
+        <p:cTn id="1" dur="indefinite" restart="never" nodeType="tmRoot"/>
+      </p:par>
+    </p:tnLst>
+  </p:timing>
+</p:sld>
+</file>
+
+<file path=ppt/slides/slide20.xml><?xml version="1.0" encoding="utf-8"?>
+<p:sld xmlns:a="http://schemas.openxmlformats.org/drawingml/2006/main" xmlns:r="http://schemas.openxmlformats.org/officeDocument/2006/relationships" xmlns:p="http://schemas.openxmlformats.org/presentationml/2006/main">
+  <p:cSld>
+    <p:spTree>
+      <p:nvGrpSpPr>
+        <p:cNvPr id="1" name=""/>
+        <p:cNvGrpSpPr/>
+        <p:nvPr/>
+      </p:nvGrpSpPr>
+      <p:grpSpPr>
+        <a:xfrm>
+          <a:off x="0" y="0"/>
+          <a:ext cx="0" cy="0"/>
+          <a:chOff x="0" y="0"/>
+          <a:chExt cx="0" cy="0"/>
+        </a:xfrm>
+      </p:grpSpPr>
+      <p:sp>
+        <p:nvSpPr>
+          <p:cNvPr id="2" name="Title 1"/>
+          <p:cNvSpPr>
+            <a:spLocks noGrp="1"/>
+          </p:cNvSpPr>
+          <p:nvPr>
+            <p:ph type="title"/>
+          </p:nvPr>
+        </p:nvSpPr>
+        <p:spPr/>
+        <p:txBody>
+          <a:bodyPr/>
+          <a:lstStyle/>
+          <a:p>
+            <a:r>
+              <a:rPr lang="en-US" dirty="0" err="1" smtClean="0"/>
+              <a:t>Github</a:t>
+            </a:r>
+            <a:r>
+              <a:rPr lang="en-US" dirty="0" smtClean="0"/>
+              <a:t> Repository</a:t>
+            </a:r>
+            <a:endParaRPr lang="en-US" dirty="0"/>
+          </a:p>
+        </p:txBody>
+      </p:sp>
+      <p:sp>
+        <p:nvSpPr>
+          <p:cNvPr id="3" name="Content Placeholder 2"/>
+          <p:cNvSpPr>
+            <a:spLocks noGrp="1"/>
+          </p:cNvSpPr>
+          <p:nvPr>
+            <p:ph idx="1"/>
+          </p:nvPr>
+        </p:nvSpPr>
+        <p:spPr>
+          <a:xfrm>
+            <a:off x="457200" y="1600201"/>
+            <a:ext cx="8229600" cy="762000"/>
+          </a:xfrm>
+        </p:spPr>
+        <p:txBody>
+          <a:bodyPr/>
+          <a:lstStyle/>
+          <a:p>
+            <a:pPr marL="0" indent="0">
+              <a:buNone/>
+            </a:pPr>
+            <a:r>
+              <a:rPr lang="en-US" dirty="0"/>
+              <a:t>https://github.com/wayko/ZendeskApp.git</a:t>
+            </a:r>
+          </a:p>
+        </p:txBody>
+      </p:sp>
+    </p:spTree>
+    <p:extLst>
+      <p:ext uri="{BB962C8B-B14F-4D97-AF65-F5344CB8AC3E}">
+        <p14:creationId xmlns:p14="http://schemas.microsoft.com/office/powerpoint/2010/main" val="1950768299"/>
       </p:ext>
     </p:extLst>
   </p:cSld>
@@ -10019,6 +10468,2993 @@
       </p:grpSpPr>
       <p:pic>
         <p:nvPicPr>
+          <p:cNvPr id="5" name="Picture 2"/>
+          <p:cNvPicPr>
+            <a:picLocks noChangeAspect="1" noChangeArrowheads="1"/>
+          </p:cNvPicPr>
+          <p:nvPr/>
+        </p:nvPicPr>
+        <p:blipFill>
+          <a:blip r:embed="rId2">
+            <a:extLst>
+              <a:ext uri="{28A0092B-C50C-407E-A947-70E740481C1C}">
+                <a14:useLocalDpi xmlns:a14="http://schemas.microsoft.com/office/drawing/2010/main" val="0"/>
+              </a:ext>
+            </a:extLst>
+          </a:blip>
+          <a:srcRect/>
+          <a:stretch>
+            <a:fillRect/>
+          </a:stretch>
+        </p:blipFill>
+        <p:spPr bwMode="auto">
+          <a:xfrm>
+            <a:off x="173621" y="619761"/>
+            <a:ext cx="8665579" cy="5704839"/>
+          </a:xfrm>
+          <a:prstGeom prst="rect">
+            <a:avLst/>
+          </a:prstGeom>
+          <a:noFill/>
+          <a:ln>
+            <a:noFill/>
+          </a:ln>
+          <a:extLst>
+            <a:ext uri="{909E8E84-426E-40DD-AFC4-6F175D3DCCD1}">
+              <a14:hiddenFill xmlns:a14="http://schemas.microsoft.com/office/drawing/2010/main">
+                <a:solidFill>
+                  <a:schemeClr val="accent1"/>
+                </a:solidFill>
+              </a14:hiddenFill>
+            </a:ext>
+            <a:ext uri="{91240B29-F687-4F45-9708-019B960494DF}">
+              <a14:hiddenLine xmlns:a14="http://schemas.microsoft.com/office/drawing/2010/main" w="9525">
+                <a:solidFill>
+                  <a:schemeClr val="tx1"/>
+                </a:solidFill>
+                <a:miter lim="800000"/>
+                <a:headEnd/>
+                <a:tailEnd/>
+              </a14:hiddenLine>
+            </a:ext>
+          </a:extLst>
+        </p:spPr>
+      </p:pic>
+    </p:spTree>
+    <p:extLst>
+      <p:ext uri="{BB962C8B-B14F-4D97-AF65-F5344CB8AC3E}">
+        <p14:creationId xmlns:p14="http://schemas.microsoft.com/office/powerpoint/2010/main" val="1791369740"/>
+      </p:ext>
+    </p:extLst>
+  </p:cSld>
+  <p:clrMapOvr>
+    <a:masterClrMapping/>
+  </p:clrMapOvr>
+  <p:timing>
+    <p:tnLst>
+      <p:par>
+        <p:cTn id="1" dur="indefinite" restart="never" nodeType="tmRoot"/>
+      </p:par>
+    </p:tnLst>
+  </p:timing>
+</p:sld>
+</file>
+
+<file path=ppt/slides/slide6.xml><?xml version="1.0" encoding="utf-8"?>
+<p:sld xmlns:a="http://schemas.openxmlformats.org/drawingml/2006/main" xmlns:r="http://schemas.openxmlformats.org/officeDocument/2006/relationships" xmlns:p="http://schemas.openxmlformats.org/presentationml/2006/main">
+  <p:cSld>
+    <p:spTree>
+      <p:nvGrpSpPr>
+        <p:cNvPr id="1" name=""/>
+        <p:cNvGrpSpPr/>
+        <p:nvPr/>
+      </p:nvGrpSpPr>
+      <p:grpSpPr>
+        <a:xfrm>
+          <a:off x="0" y="0"/>
+          <a:ext cx="0" cy="0"/>
+          <a:chOff x="0" y="0"/>
+          <a:chExt cx="0" cy="0"/>
+        </a:xfrm>
+      </p:grpSpPr>
+      <p:sp>
+        <p:nvSpPr>
+          <p:cNvPr id="3" name="Content Placeholder 2"/>
+          <p:cNvSpPr>
+            <a:spLocks noGrp="1"/>
+          </p:cNvSpPr>
+          <p:nvPr>
+            <p:ph idx="1"/>
+          </p:nvPr>
+        </p:nvSpPr>
+        <p:spPr>
+          <a:xfrm>
+            <a:off x="21771" y="32657"/>
+            <a:ext cx="2873829" cy="4615543"/>
+          </a:xfrm>
+        </p:spPr>
+        <p:style>
+          <a:lnRef idx="0">
+            <a:schemeClr val="accent3"/>
+          </a:lnRef>
+          <a:fillRef idx="1003">
+            <a:schemeClr val="dk2"/>
+          </a:fillRef>
+          <a:effectRef idx="3">
+            <a:schemeClr val="accent3"/>
+          </a:effectRef>
+          <a:fontRef idx="minor">
+            <a:schemeClr val="lt1"/>
+          </a:fontRef>
+        </p:style>
+        <p:txBody>
+          <a:bodyPr>
+            <a:normAutofit fontScale="25000" lnSpcReduction="20000"/>
+          </a:bodyPr>
+          <a:lstStyle/>
+          <a:p>
+            <a:pPr marL="0" indent="0">
+              <a:buNone/>
+            </a:pPr>
+            <a:r>
+              <a:rPr lang="en-US" dirty="0" smtClean="0"/>
+              <a:t>&lt;style&gt;</a:t>
+            </a:r>
+          </a:p>
+          <a:p>
+            <a:pPr marL="0" indent="0">
+              <a:buNone/>
+            </a:pPr>
+            <a:r>
+              <a:rPr lang="en-US" dirty="0" err="1" smtClean="0"/>
+              <a:t>input.createtable</a:t>
+            </a:r>
+            <a:r>
+              <a:rPr lang="en-US" dirty="0" smtClean="0"/>
+              <a:t> {</a:t>
+            </a:r>
+          </a:p>
+          <a:p>
+            <a:pPr marL="0" indent="0">
+              <a:buNone/>
+            </a:pPr>
+            <a:r>
+              <a:rPr lang="en-US" dirty="0" smtClean="0"/>
+              <a:t>    </a:t>
+            </a:r>
+            <a:r>
+              <a:rPr lang="en-US" dirty="0" err="1" smtClean="0"/>
+              <a:t>display:none</a:t>
+            </a:r>
+            <a:r>
+              <a:rPr lang="en-US" dirty="0" smtClean="0"/>
+              <a:t>;</a:t>
+            </a:r>
+          </a:p>
+          <a:p>
+            <a:pPr marL="0" indent="0">
+              <a:buNone/>
+            </a:pPr>
+            <a:r>
+              <a:rPr lang="en-US" dirty="0" smtClean="0"/>
+              <a:t>}</a:t>
+            </a:r>
+          </a:p>
+          <a:p>
+            <a:pPr marL="0" indent="0">
+              <a:buNone/>
+            </a:pPr>
+            <a:r>
+              <a:rPr lang="en-US" dirty="0" smtClean="0"/>
+              <a:t>&lt;/style&gt;</a:t>
+            </a:r>
+          </a:p>
+          <a:p>
+            <a:pPr marL="0" indent="0">
+              <a:buNone/>
+            </a:pPr>
+            <a:r>
+              <a:rPr lang="en-US" dirty="0" smtClean="0"/>
+              <a:t>  &lt;script language="JavaScript"&gt;</a:t>
+            </a:r>
+          </a:p>
+          <a:p>
+            <a:pPr marL="0" indent="0">
+              <a:buNone/>
+            </a:pPr>
+            <a:r>
+              <a:rPr lang="en-US" dirty="0" smtClean="0"/>
+              <a:t>&lt;!--</a:t>
+            </a:r>
+          </a:p>
+          <a:p>
+            <a:pPr marL="0" indent="0">
+              <a:buNone/>
+            </a:pPr>
+            <a:r>
+              <a:rPr lang="en-US" dirty="0" err="1" smtClean="0"/>
+              <a:t>writeConsole</a:t>
+            </a:r>
+            <a:r>
+              <a:rPr lang="en-US" dirty="0" smtClean="0"/>
+              <a:t> = function(content) {</a:t>
+            </a:r>
+          </a:p>
+          <a:p>
+            <a:pPr marL="0" indent="0">
+              <a:buNone/>
+            </a:pPr>
+            <a:r>
+              <a:rPr lang="en-US" dirty="0" smtClean="0"/>
+              <a:t> </a:t>
+            </a:r>
+            <a:r>
+              <a:rPr lang="en-US" dirty="0" err="1" smtClean="0"/>
+              <a:t>top.consoleRef</a:t>
+            </a:r>
+            <a:r>
+              <a:rPr lang="en-US" dirty="0" smtClean="0"/>
+              <a:t>=</a:t>
+            </a:r>
+            <a:r>
+              <a:rPr lang="en-US" dirty="0" err="1" smtClean="0"/>
+              <a:t>window.open</a:t>
+            </a:r>
+            <a:r>
+              <a:rPr lang="en-US" dirty="0" smtClean="0"/>
+              <a:t>('','</a:t>
+            </a:r>
+            <a:r>
+              <a:rPr lang="en-US" dirty="0" err="1" smtClean="0"/>
+              <a:t>myconsole</a:t>
+            </a:r>
+            <a:r>
+              <a:rPr lang="en-US" dirty="0" smtClean="0"/>
+              <a:t>',</a:t>
+            </a:r>
+          </a:p>
+          <a:p>
+            <a:pPr marL="0" indent="0">
+              <a:buNone/>
+            </a:pPr>
+            <a:r>
+              <a:rPr lang="en-US" dirty="0" smtClean="0"/>
+              <a:t>  'width=637,height=825'</a:t>
+            </a:r>
+          </a:p>
+          <a:p>
+            <a:pPr marL="0" indent="0">
+              <a:buNone/>
+            </a:pPr>
+            <a:r>
+              <a:rPr lang="en-US" dirty="0" smtClean="0"/>
+              <a:t>   +',</a:t>
+            </a:r>
+            <a:r>
+              <a:rPr lang="en-US" dirty="0" err="1" smtClean="0"/>
+              <a:t>menubar</a:t>
+            </a:r>
+            <a:r>
+              <a:rPr lang="en-US" dirty="0" smtClean="0"/>
+              <a:t>=1'</a:t>
+            </a:r>
+          </a:p>
+          <a:p>
+            <a:pPr marL="0" indent="0">
+              <a:buNone/>
+            </a:pPr>
+            <a:r>
+              <a:rPr lang="en-US" dirty="0" smtClean="0"/>
+              <a:t>   +',toolbar=1'</a:t>
+            </a:r>
+          </a:p>
+          <a:p>
+            <a:pPr marL="0" indent="0">
+              <a:buNone/>
+            </a:pPr>
+            <a:r>
+              <a:rPr lang="en-US" dirty="0" smtClean="0"/>
+              <a:t>   +',status=0'</a:t>
+            </a:r>
+          </a:p>
+          <a:p>
+            <a:pPr marL="0" indent="0">
+              <a:buNone/>
+            </a:pPr>
+            <a:r>
+              <a:rPr lang="en-US" dirty="0" smtClean="0"/>
+              <a:t>   +',scrollbars=1'</a:t>
+            </a:r>
+          </a:p>
+          <a:p>
+            <a:pPr marL="0" indent="0">
+              <a:buNone/>
+            </a:pPr>
+            <a:r>
+              <a:rPr lang="en-US" dirty="0" smtClean="0"/>
+              <a:t>   +',resizable=1')</a:t>
+            </a:r>
+          </a:p>
+          <a:p>
+            <a:pPr marL="0" indent="0">
+              <a:buNone/>
+            </a:pPr>
+            <a:r>
+              <a:rPr lang="en-US" dirty="0" smtClean="0"/>
+              <a:t> </a:t>
+            </a:r>
+            <a:r>
+              <a:rPr lang="en-US" dirty="0" err="1" smtClean="0"/>
+              <a:t>top.consoleRef.document.open</a:t>
+            </a:r>
+            <a:r>
+              <a:rPr lang="en-US" dirty="0" smtClean="0"/>
+              <a:t>("text/</a:t>
+            </a:r>
+            <a:r>
+              <a:rPr lang="en-US" dirty="0" err="1" smtClean="0"/>
+              <a:t>html","replace</a:t>
+            </a:r>
+            <a:r>
+              <a:rPr lang="en-US" dirty="0" smtClean="0"/>
+              <a:t>");</a:t>
+            </a:r>
+          </a:p>
+          <a:p>
+            <a:pPr marL="0" indent="0">
+              <a:buNone/>
+            </a:pPr>
+            <a:r>
+              <a:rPr lang="en-US" dirty="0" smtClean="0"/>
+              <a:t> </a:t>
+            </a:r>
+            <a:r>
+              <a:rPr lang="en-US" dirty="0" err="1" smtClean="0"/>
+              <a:t>top.consoleRef.document.writeln</a:t>
+            </a:r>
+            <a:r>
+              <a:rPr lang="en-US" dirty="0" smtClean="0"/>
+              <a:t>(</a:t>
+            </a:r>
+          </a:p>
+          <a:p>
+            <a:pPr marL="0" indent="0">
+              <a:buNone/>
+            </a:pPr>
+            <a:r>
+              <a:rPr lang="en-US" dirty="0" smtClean="0"/>
+              <a:t>  '&lt;html&gt;&lt;head&gt;&lt;title&gt;Signature Page&lt;/title&gt;'</a:t>
+            </a:r>
+          </a:p>
+          <a:p>
+            <a:pPr marL="0" indent="0">
+              <a:buNone/>
+            </a:pPr>
+            <a:r>
+              <a:rPr lang="en-US" dirty="0" smtClean="0"/>
+              <a:t>+'&lt;/head&gt;'</a:t>
+            </a:r>
+          </a:p>
+          <a:p>
+            <a:pPr marL="0" indent="0">
+              <a:buNone/>
+            </a:pPr>
+            <a:r>
+              <a:rPr lang="en-US" dirty="0" smtClean="0"/>
+              <a:t> +'&lt;style&gt;'</a:t>
+            </a:r>
+          </a:p>
+          <a:p>
+            <a:pPr marL="0" indent="0">
+              <a:buNone/>
+            </a:pPr>
+            <a:r>
+              <a:rPr lang="en-US" dirty="0" smtClean="0"/>
+              <a:t>+'</a:t>
+            </a:r>
+            <a:r>
+              <a:rPr lang="en-US" dirty="0" err="1" smtClean="0"/>
+              <a:t>th</a:t>
+            </a:r>
+            <a:r>
+              <a:rPr lang="en-US" dirty="0" smtClean="0"/>
+              <a:t> {'</a:t>
+            </a:r>
+          </a:p>
+          <a:p>
+            <a:pPr marL="0" indent="0">
+              <a:buNone/>
+            </a:pPr>
+            <a:r>
+              <a:rPr lang="en-US" dirty="0" smtClean="0"/>
+              <a:t>+'color: #FFFFFF;'</a:t>
+            </a:r>
+          </a:p>
+          <a:p>
+            <a:pPr marL="0" indent="0">
+              <a:buNone/>
+            </a:pPr>
+            <a:r>
+              <a:rPr lang="en-US" dirty="0" smtClean="0"/>
+              <a:t>+'border-bottom: 1px solid #000000;'</a:t>
+            </a:r>
+          </a:p>
+          <a:p>
+            <a:pPr marL="0" indent="0">
+              <a:buNone/>
+            </a:pPr>
+            <a:r>
+              <a:rPr lang="en-US" dirty="0" smtClean="0"/>
+              <a:t>+'border-top: 1px solid #000000;'</a:t>
+            </a:r>
+          </a:p>
+          <a:p>
+            <a:pPr marL="0" indent="0">
+              <a:buNone/>
+            </a:pPr>
+            <a:r>
+              <a:rPr lang="en-US" dirty="0" smtClean="0"/>
+              <a:t>+'background-color:#CCCCCC;'</a:t>
+            </a:r>
+          </a:p>
+          <a:p>
+            <a:pPr marL="0" indent="0">
+              <a:buNone/>
+            </a:pPr>
+            <a:r>
+              <a:rPr lang="en-US" dirty="0" smtClean="0"/>
+              <a:t>+'}'</a:t>
+            </a:r>
+          </a:p>
+          <a:p>
+            <a:pPr marL="0" indent="0">
+              <a:buNone/>
+            </a:pPr>
+            <a:r>
+              <a:rPr lang="en-US" dirty="0" smtClean="0"/>
+              <a:t>+'</a:t>
+            </a:r>
+            <a:r>
+              <a:rPr lang="en-US" dirty="0" err="1" smtClean="0"/>
+              <a:t>ul</a:t>
+            </a:r>
+            <a:r>
+              <a:rPr lang="en-US" dirty="0" smtClean="0"/>
+              <a:t> li{'</a:t>
+            </a:r>
+          </a:p>
+          <a:p>
+            <a:pPr marL="0" indent="0">
+              <a:buNone/>
+            </a:pPr>
+            <a:r>
+              <a:rPr lang="en-US" dirty="0" smtClean="0"/>
+              <a:t>+'</a:t>
+            </a:r>
+            <a:r>
+              <a:rPr lang="en-US" dirty="0" err="1" smtClean="0"/>
+              <a:t>list-style-type:decimal</a:t>
+            </a:r>
+            <a:r>
+              <a:rPr lang="en-US" dirty="0" smtClean="0"/>
+              <a:t>;'</a:t>
+            </a:r>
+          </a:p>
+          <a:p>
+            <a:pPr marL="0" indent="0">
+              <a:buNone/>
+            </a:pPr>
+            <a:r>
+              <a:rPr lang="en-US" dirty="0" smtClean="0"/>
+              <a:t>+'}'</a:t>
+            </a:r>
+          </a:p>
+          <a:p>
+            <a:pPr marL="0" indent="0">
+              <a:buNone/>
+            </a:pPr>
+            <a:r>
+              <a:rPr lang="en-US" dirty="0" smtClean="0"/>
+              <a:t>+'table { empty-cells: show; }'</a:t>
+            </a:r>
+          </a:p>
+          <a:p>
+            <a:pPr marL="0" indent="0">
+              <a:buNone/>
+            </a:pPr>
+            <a:r>
+              <a:rPr lang="en-US" dirty="0" smtClean="0"/>
+              <a:t>+'</a:t>
+            </a:r>
+            <a:r>
+              <a:rPr lang="en-US" dirty="0" err="1" smtClean="0"/>
+              <a:t>td#solution</a:t>
+            </a:r>
+            <a:r>
+              <a:rPr lang="en-US" dirty="0" smtClean="0"/>
+              <a:t>{'</a:t>
+            </a:r>
+          </a:p>
+          <a:p>
+            <a:pPr marL="0" indent="0">
+              <a:buNone/>
+            </a:pPr>
+            <a:r>
+              <a:rPr lang="en-US" dirty="0" smtClean="0"/>
+              <a:t>+'border-left:3px solid #000000;'</a:t>
+            </a:r>
+          </a:p>
+          <a:p>
+            <a:pPr marL="0" indent="0">
+              <a:buNone/>
+            </a:pPr>
+            <a:r>
+              <a:rPr lang="en-US" dirty="0" smtClean="0"/>
+              <a:t>+'border-bottom:3px solid #000000;'</a:t>
+            </a:r>
+          </a:p>
+          <a:p>
+            <a:pPr marL="0" indent="0">
+              <a:buNone/>
+            </a:pPr>
+            <a:r>
+              <a:rPr lang="en-US" dirty="0" smtClean="0"/>
+              <a:t>+'border-top:3px solid #000000;'</a:t>
+            </a:r>
+          </a:p>
+          <a:p>
+            <a:pPr marL="0" indent="0">
+              <a:buNone/>
+            </a:pPr>
+            <a:r>
+              <a:rPr lang="en-US" dirty="0" smtClean="0"/>
+              <a:t>+'width:2000px;'</a:t>
+            </a:r>
+          </a:p>
+          <a:p>
+            <a:pPr marL="0" indent="0">
+              <a:buNone/>
+            </a:pPr>
+            <a:r>
+              <a:rPr lang="en-US" dirty="0" smtClean="0"/>
+              <a:t>+'}'</a:t>
+            </a:r>
+          </a:p>
+        </p:txBody>
+      </p:sp>
+      <p:sp>
+        <p:nvSpPr>
+          <p:cNvPr id="4" name="Rectangle 3"/>
+          <p:cNvSpPr/>
+          <p:nvPr/>
+        </p:nvSpPr>
+        <p:spPr>
+          <a:xfrm>
+            <a:off x="0" y="4457343"/>
+            <a:ext cx="2133600" cy="2400657"/>
+          </a:xfrm>
+          <a:prstGeom prst="rect">
+            <a:avLst/>
+          </a:prstGeom>
+        </p:spPr>
+        <p:style>
+          <a:lnRef idx="0">
+            <a:schemeClr val="accent2"/>
+          </a:lnRef>
+          <a:fillRef idx="1003">
+            <a:schemeClr val="dk2"/>
+          </a:fillRef>
+          <a:effectRef idx="3">
+            <a:schemeClr val="accent2"/>
+          </a:effectRef>
+          <a:fontRef idx="minor">
+            <a:schemeClr val="lt1"/>
+          </a:fontRef>
+        </p:style>
+        <p:txBody>
+          <a:bodyPr wrap="square">
+            <a:spAutoFit/>
+          </a:bodyPr>
+          <a:lstStyle/>
+          <a:p>
+            <a:r>
+              <a:rPr lang="en-US" sz="1000" dirty="0" smtClean="0">
+                <a:solidFill>
+                  <a:prstClr val="white"/>
+                </a:solidFill>
+              </a:rPr>
+              <a:t>+'td#solution1{'</a:t>
+            </a:r>
+          </a:p>
+          <a:p>
+            <a:r>
+              <a:rPr lang="en-US" sz="1000" dirty="0" smtClean="0">
+                <a:solidFill>
+                  <a:prstClr val="white"/>
+                </a:solidFill>
+              </a:rPr>
+              <a:t>+'border-right:3px solid #000000;'</a:t>
+            </a:r>
+          </a:p>
+          <a:p>
+            <a:r>
+              <a:rPr lang="en-US" sz="1000" dirty="0" smtClean="0">
+                <a:solidFill>
+                  <a:prstClr val="white"/>
+                </a:solidFill>
+              </a:rPr>
+              <a:t>+'border-bottom:3px solid #000000;'</a:t>
+            </a:r>
+          </a:p>
+          <a:p>
+            <a:r>
+              <a:rPr lang="en-US" sz="1000" dirty="0" smtClean="0">
+                <a:solidFill>
+                  <a:prstClr val="white"/>
+                </a:solidFill>
+              </a:rPr>
+              <a:t>+'border-top:3px solid #000000;'</a:t>
+            </a:r>
+          </a:p>
+          <a:p>
+            <a:r>
+              <a:rPr lang="en-US" sz="1000" dirty="0" smtClean="0">
+                <a:solidFill>
+                  <a:prstClr val="white"/>
+                </a:solidFill>
+              </a:rPr>
+              <a:t>+'width:2000px;'</a:t>
+            </a:r>
+          </a:p>
+          <a:p>
+            <a:r>
+              <a:rPr lang="en-US" sz="1000" dirty="0" smtClean="0">
+                <a:solidFill>
+                  <a:prstClr val="white"/>
+                </a:solidFill>
+              </a:rPr>
+              <a:t>+'}'</a:t>
+            </a:r>
+          </a:p>
+          <a:p>
+            <a:r>
+              <a:rPr lang="en-US" sz="1000" dirty="0" smtClean="0">
+                <a:solidFill>
+                  <a:prstClr val="white"/>
+                </a:solidFill>
+              </a:rPr>
+              <a:t>+'&lt;/style&gt;'</a:t>
+            </a:r>
+          </a:p>
+          <a:p>
+            <a:r>
+              <a:rPr lang="en-US" sz="1000" dirty="0" smtClean="0">
+                <a:solidFill>
+                  <a:prstClr val="white"/>
+                </a:solidFill>
+              </a:rPr>
+              <a:t> +'&lt;body </a:t>
+            </a:r>
+            <a:r>
+              <a:rPr lang="en-US" sz="1000" dirty="0" err="1" smtClean="0">
+                <a:solidFill>
+                  <a:prstClr val="white"/>
+                </a:solidFill>
+              </a:rPr>
+              <a:t>onLoad</a:t>
+            </a:r>
+            <a:r>
+              <a:rPr lang="en-US" sz="1000" dirty="0" smtClean="0">
+                <a:solidFill>
+                  <a:prstClr val="white"/>
+                </a:solidFill>
+              </a:rPr>
+              <a:t>="</a:t>
+            </a:r>
+            <a:r>
+              <a:rPr lang="en-US" sz="1000" dirty="0" err="1" smtClean="0">
+                <a:solidFill>
+                  <a:prstClr val="white"/>
+                </a:solidFill>
+              </a:rPr>
+              <a:t>self.focus</a:t>
+            </a:r>
+            <a:r>
+              <a:rPr lang="en-US" sz="1000" dirty="0" smtClean="0">
+                <a:solidFill>
+                  <a:prstClr val="white"/>
+                </a:solidFill>
+              </a:rPr>
+              <a:t>()" style="background: white; font-size: 11px; font-family: Arial, Helvetica, sans-serif"&gt;'</a:t>
+            </a:r>
+          </a:p>
+          <a:p>
+            <a:r>
+              <a:rPr lang="en-US" sz="1000" dirty="0" smtClean="0">
+                <a:solidFill>
+                  <a:prstClr val="white"/>
+                </a:solidFill>
+              </a:rPr>
+              <a:t> +'&lt;center&gt;&lt;A HREF="</a:t>
+            </a:r>
+            <a:r>
+              <a:rPr lang="en-US" sz="1000" dirty="0" err="1" smtClean="0">
+                <a:solidFill>
+                  <a:prstClr val="white"/>
+                </a:solidFill>
+              </a:rPr>
+              <a:t>javascript:window.print</a:t>
+            </a:r>
+            <a:r>
+              <a:rPr lang="en-US" sz="1000" dirty="0" smtClean="0">
+                <a:solidFill>
+                  <a:prstClr val="white"/>
+                </a:solidFill>
+              </a:rPr>
+              <a:t>()"&gt;Click to Print This Page&lt;/A&gt;&lt;/center&gt;'</a:t>
+            </a:r>
+          </a:p>
+          <a:p>
+            <a:r>
+              <a:rPr lang="en-US" sz="1000" dirty="0" smtClean="0">
+                <a:solidFill>
+                  <a:prstClr val="white"/>
+                </a:solidFill>
+              </a:rPr>
+              <a:t> </a:t>
+            </a:r>
+            <a:endParaRPr lang="en-US" sz="1000" dirty="0">
+              <a:solidFill>
+                <a:prstClr val="white"/>
+              </a:solidFill>
+            </a:endParaRPr>
+          </a:p>
+        </p:txBody>
+      </p:sp>
+      <p:sp>
+        <p:nvSpPr>
+          <p:cNvPr id="5" name="Rectangle 4"/>
+          <p:cNvSpPr/>
+          <p:nvPr/>
+        </p:nvSpPr>
+        <p:spPr>
+          <a:xfrm>
+            <a:off x="3118757" y="43543"/>
+            <a:ext cx="2057400" cy="2092881"/>
+          </a:xfrm>
+          <a:prstGeom prst="rect">
+            <a:avLst/>
+          </a:prstGeom>
+        </p:spPr>
+        <p:style>
+          <a:lnRef idx="0">
+            <a:schemeClr val="accent2"/>
+          </a:lnRef>
+          <a:fillRef idx="1003">
+            <a:schemeClr val="dk2"/>
+          </a:fillRef>
+          <a:effectRef idx="3">
+            <a:schemeClr val="accent2"/>
+          </a:effectRef>
+          <a:fontRef idx="minor">
+            <a:schemeClr val="lt1"/>
+          </a:fontRef>
+        </p:style>
+        <p:txBody>
+          <a:bodyPr wrap="square">
+            <a:spAutoFit/>
+          </a:bodyPr>
+          <a:lstStyle/>
+          <a:p>
+            <a:r>
+              <a:rPr lang="en-US" sz="1000" dirty="0" smtClean="0">
+                <a:solidFill>
+                  <a:prstClr val="white"/>
+                </a:solidFill>
+              </a:rPr>
+              <a:t>+'&lt;table width="100%"&gt;&lt;</a:t>
+            </a:r>
+            <a:r>
+              <a:rPr lang="en-US" sz="1000" dirty="0" err="1" smtClean="0">
+                <a:solidFill>
+                  <a:prstClr val="white"/>
+                </a:solidFill>
+              </a:rPr>
+              <a:t>tr</a:t>
+            </a:r>
+            <a:r>
+              <a:rPr lang="en-US" sz="1000" dirty="0" smtClean="0">
+                <a:solidFill>
+                  <a:prstClr val="white"/>
+                </a:solidFill>
+              </a:rPr>
+              <a:t>&gt;&lt;td width=50%&gt;'</a:t>
+            </a:r>
+          </a:p>
+          <a:p>
+            <a:r>
+              <a:rPr lang="en-US" sz="1000" dirty="0" smtClean="0">
+                <a:solidFill>
+                  <a:prstClr val="white"/>
+                </a:solidFill>
+              </a:rPr>
+              <a:t> +'&lt;</a:t>
+            </a:r>
+            <a:r>
+              <a:rPr lang="en-US" sz="1000" dirty="0" err="1" smtClean="0">
+                <a:solidFill>
+                  <a:prstClr val="white"/>
+                </a:solidFill>
+              </a:rPr>
+              <a:t>img</a:t>
+            </a:r>
+            <a:r>
+              <a:rPr lang="en-US" sz="1000" dirty="0" smtClean="0">
+                <a:solidFill>
+                  <a:prstClr val="white"/>
+                </a:solidFill>
+              </a:rPr>
+              <a:t> </a:t>
+            </a:r>
+            <a:r>
+              <a:rPr lang="en-US" sz="1000" dirty="0" err="1" smtClean="0">
+                <a:solidFill>
+                  <a:prstClr val="white"/>
+                </a:solidFill>
+              </a:rPr>
+              <a:t>src</a:t>
+            </a:r>
+            <a:r>
+              <a:rPr lang="en-US" sz="1000" dirty="0" smtClean="0">
+                <a:solidFill>
+                  <a:prstClr val="white"/>
+                </a:solidFill>
+              </a:rPr>
+              <a:t>="http://www.tcicollege.edu/sites/default/files/tci_favicon.png"&gt;College Of Technology&lt;/center&gt;'</a:t>
+            </a:r>
+          </a:p>
+          <a:p>
+            <a:r>
+              <a:rPr lang="en-US" sz="1000" dirty="0" smtClean="0">
+                <a:solidFill>
+                  <a:prstClr val="white"/>
+                </a:solidFill>
+              </a:rPr>
+              <a:t> +'&lt;/td&gt;&lt;td  width=50% align=left&gt;'</a:t>
+            </a:r>
+          </a:p>
+          <a:p>
+            <a:r>
+              <a:rPr lang="en-US" sz="1000" dirty="0" smtClean="0">
+                <a:solidFill>
+                  <a:prstClr val="white"/>
+                </a:solidFill>
+              </a:rPr>
+              <a:t> +'http://www.tcicollege.edu&lt;br /&gt;'</a:t>
+            </a:r>
+          </a:p>
+          <a:p>
+            <a:r>
+              <a:rPr lang="en-US" sz="1000" dirty="0" smtClean="0">
+                <a:solidFill>
+                  <a:prstClr val="white"/>
+                </a:solidFill>
+              </a:rPr>
+              <a:t>+'http://helpdesk.tcicollege.edu&lt;</a:t>
+            </a:r>
+            <a:r>
+              <a:rPr lang="en-US" sz="1000" dirty="0" err="1" smtClean="0">
+                <a:solidFill>
+                  <a:prstClr val="white"/>
+                </a:solidFill>
+              </a:rPr>
+              <a:t>br</a:t>
+            </a:r>
+            <a:r>
+              <a:rPr lang="en-US" sz="1000" dirty="0" smtClean="0">
+                <a:solidFill>
+                  <a:prstClr val="white"/>
+                </a:solidFill>
+              </a:rPr>
+              <a:t> /&gt;'</a:t>
+            </a:r>
+          </a:p>
+          <a:p>
+            <a:r>
+              <a:rPr lang="en-US" sz="1000" dirty="0" smtClean="0">
+                <a:solidFill>
+                  <a:prstClr val="white"/>
+                </a:solidFill>
+              </a:rPr>
+              <a:t> +'212-594-4000&lt;</a:t>
+            </a:r>
+            <a:r>
+              <a:rPr lang="en-US" sz="1000" dirty="0" err="1" smtClean="0">
+                <a:solidFill>
+                  <a:prstClr val="white"/>
+                </a:solidFill>
+              </a:rPr>
+              <a:t>br</a:t>
+            </a:r>
+            <a:r>
+              <a:rPr lang="en-US" sz="1000" dirty="0" smtClean="0">
+                <a:solidFill>
+                  <a:prstClr val="white"/>
+                </a:solidFill>
+              </a:rPr>
+              <a:t> /&gt;'</a:t>
+            </a:r>
+          </a:p>
+          <a:p>
+            <a:r>
+              <a:rPr lang="en-US" sz="1000" dirty="0" smtClean="0">
+                <a:solidFill>
+                  <a:prstClr val="white"/>
+                </a:solidFill>
+              </a:rPr>
+              <a:t> +'&lt;/td&gt;&lt;/</a:t>
+            </a:r>
+            <a:r>
+              <a:rPr lang="en-US" sz="1000" dirty="0" err="1" smtClean="0">
+                <a:solidFill>
+                  <a:prstClr val="white"/>
+                </a:solidFill>
+              </a:rPr>
+              <a:t>tr</a:t>
+            </a:r>
+            <a:r>
+              <a:rPr lang="en-US" sz="1000" dirty="0" smtClean="0">
+                <a:solidFill>
+                  <a:prstClr val="white"/>
+                </a:solidFill>
+              </a:rPr>
+              <a:t>&gt;&lt;/table&gt;'</a:t>
+            </a:r>
+          </a:p>
+          <a:p>
+            <a:r>
+              <a:rPr lang="en-US" sz="1000" dirty="0" smtClean="0">
+                <a:solidFill>
+                  <a:prstClr val="white"/>
+                </a:solidFill>
+              </a:rPr>
+              <a:t> +content</a:t>
+            </a:r>
+          </a:p>
+        </p:txBody>
+      </p:sp>
+      <p:sp>
+        <p:nvSpPr>
+          <p:cNvPr id="6" name="Rectangle 5"/>
+          <p:cNvSpPr/>
+          <p:nvPr/>
+        </p:nvSpPr>
+        <p:spPr>
+          <a:xfrm>
+            <a:off x="5867400" y="-6906"/>
+            <a:ext cx="3048000" cy="7017306"/>
+          </a:xfrm>
+          <a:prstGeom prst="rect">
+            <a:avLst/>
+          </a:prstGeom>
+        </p:spPr>
+        <p:style>
+          <a:lnRef idx="0">
+            <a:schemeClr val="accent2"/>
+          </a:lnRef>
+          <a:fillRef idx="1003">
+            <a:schemeClr val="dk2"/>
+          </a:fillRef>
+          <a:effectRef idx="3">
+            <a:schemeClr val="accent2"/>
+          </a:effectRef>
+          <a:fontRef idx="minor">
+            <a:schemeClr val="lt1"/>
+          </a:fontRef>
+        </p:style>
+        <p:txBody>
+          <a:bodyPr wrap="square">
+            <a:spAutoFit/>
+          </a:bodyPr>
+          <a:lstStyle/>
+          <a:p>
+            <a:r>
+              <a:rPr lang="en-US" sz="1000" dirty="0" smtClean="0">
+                <a:solidFill>
+                  <a:prstClr val="white"/>
+                </a:solidFill>
+              </a:rPr>
+              <a:t>&lt;/</a:t>
+            </a:r>
+            <a:r>
+              <a:rPr lang="en-US" sz="1000" dirty="0" err="1" smtClean="0">
+                <a:solidFill>
+                  <a:prstClr val="white"/>
+                </a:solidFill>
+              </a:rPr>
+              <a:t>tr</a:t>
+            </a:r>
+            <a:r>
+              <a:rPr lang="en-US" sz="1000" dirty="0" smtClean="0">
+                <a:solidFill>
+                  <a:prstClr val="white"/>
+                </a:solidFill>
+              </a:rPr>
+              <a:t>&gt;</a:t>
+            </a:r>
+          </a:p>
+          <a:p>
+            <a:r>
+              <a:rPr lang="en-US" sz="1000" dirty="0" smtClean="0">
+                <a:solidFill>
+                  <a:prstClr val="white"/>
+                </a:solidFill>
+              </a:rPr>
+              <a:t>&lt;</a:t>
+            </a:r>
+            <a:r>
+              <a:rPr lang="en-US" sz="1000" dirty="0" err="1" smtClean="0">
+                <a:solidFill>
+                  <a:prstClr val="white"/>
+                </a:solidFill>
+              </a:rPr>
+              <a:t>tr</a:t>
+            </a:r>
+            <a:r>
+              <a:rPr lang="en-US" sz="1000" dirty="0" smtClean="0">
+                <a:solidFill>
+                  <a:prstClr val="white"/>
+                </a:solidFill>
+              </a:rPr>
+              <a:t>&gt;</a:t>
+            </a:r>
+          </a:p>
+          <a:p>
+            <a:r>
+              <a:rPr lang="en-US" sz="1000" dirty="0" smtClean="0">
+                <a:solidFill>
+                  <a:prstClr val="white"/>
+                </a:solidFill>
+              </a:rPr>
+              <a:t>&lt;td&gt;&lt;strong&gt;Ticket ID#:&lt;/strong&gt; {{ticket.id}}&lt;</a:t>
+            </a:r>
+            <a:r>
+              <a:rPr lang="en-US" sz="1000" dirty="0" err="1" smtClean="0">
+                <a:solidFill>
+                  <a:prstClr val="white"/>
+                </a:solidFill>
+              </a:rPr>
+              <a:t>br</a:t>
+            </a:r>
+            <a:r>
+              <a:rPr lang="en-US" sz="1000" dirty="0" smtClean="0">
+                <a:solidFill>
+                  <a:prstClr val="white"/>
+                </a:solidFill>
+              </a:rPr>
+              <a:t> /&gt;&lt;strong&gt;Ticket URL:&lt;/strong&gt; {{ticket.url}}&lt;</a:t>
+            </a:r>
+            <a:r>
+              <a:rPr lang="en-US" sz="1000" dirty="0" err="1" smtClean="0">
+                <a:solidFill>
+                  <a:prstClr val="white"/>
+                </a:solidFill>
+              </a:rPr>
+              <a:t>br</a:t>
+            </a:r>
+            <a:r>
+              <a:rPr lang="en-US" sz="1000" dirty="0" smtClean="0">
+                <a:solidFill>
+                  <a:prstClr val="white"/>
+                </a:solidFill>
+              </a:rPr>
+              <a:t> /&gt;&lt;/td&gt;</a:t>
+            </a:r>
+          </a:p>
+          <a:p>
+            <a:r>
+              <a:rPr lang="en-US" sz="1000" dirty="0" smtClean="0">
+                <a:solidFill>
+                  <a:prstClr val="white"/>
+                </a:solidFill>
+              </a:rPr>
+              <a:t>&lt;td&gt;&lt;strong&gt;Serial Number \ Service Tag#:&lt;/strong&gt;{{ticket.ticket_field_21139718}}&lt;</a:t>
+            </a:r>
+            <a:r>
+              <a:rPr lang="en-US" sz="1000" dirty="0" err="1" smtClean="0">
+                <a:solidFill>
+                  <a:prstClr val="white"/>
+                </a:solidFill>
+              </a:rPr>
+              <a:t>br</a:t>
+            </a:r>
+            <a:r>
+              <a:rPr lang="en-US" sz="1000" dirty="0" smtClean="0">
+                <a:solidFill>
+                  <a:prstClr val="white"/>
+                </a:solidFill>
+              </a:rPr>
+              <a:t> /&gt;&lt;/td&gt;</a:t>
+            </a:r>
+          </a:p>
+          <a:p>
+            <a:r>
+              <a:rPr lang="en-US" sz="1000" dirty="0" smtClean="0">
+                <a:solidFill>
+                  <a:prstClr val="white"/>
+                </a:solidFill>
+              </a:rPr>
+              <a:t>&lt;/</a:t>
+            </a:r>
+            <a:r>
+              <a:rPr lang="en-US" sz="1000" dirty="0" err="1" smtClean="0">
+                <a:solidFill>
+                  <a:prstClr val="white"/>
+                </a:solidFill>
+              </a:rPr>
+              <a:t>tr</a:t>
+            </a:r>
+            <a:r>
+              <a:rPr lang="en-US" sz="1000" dirty="0" smtClean="0">
+                <a:solidFill>
+                  <a:prstClr val="white"/>
+                </a:solidFill>
+              </a:rPr>
+              <a:t>&gt;</a:t>
+            </a:r>
+          </a:p>
+          <a:p>
+            <a:r>
+              <a:rPr lang="en-US" sz="1000" dirty="0" smtClean="0">
+                <a:solidFill>
+                  <a:prstClr val="white"/>
+                </a:solidFill>
+              </a:rPr>
+              <a:t>&lt;</a:t>
+            </a:r>
+            <a:r>
+              <a:rPr lang="en-US" sz="1000" dirty="0" err="1" smtClean="0">
+                <a:solidFill>
+                  <a:prstClr val="white"/>
+                </a:solidFill>
+              </a:rPr>
+              <a:t>tr</a:t>
+            </a:r>
+            <a:r>
+              <a:rPr lang="en-US" sz="1000" dirty="0" smtClean="0">
+                <a:solidFill>
+                  <a:prstClr val="white"/>
+                </a:solidFill>
+              </a:rPr>
+              <a:t>&gt;</a:t>
+            </a:r>
+          </a:p>
+          <a:p>
+            <a:r>
+              <a:rPr lang="en-US" sz="1000" dirty="0" smtClean="0">
+                <a:solidFill>
+                  <a:prstClr val="white"/>
+                </a:solidFill>
+              </a:rPr>
+              <a:t>&lt;</a:t>
+            </a:r>
+            <a:r>
+              <a:rPr lang="en-US" sz="1000" dirty="0" err="1" smtClean="0">
+                <a:solidFill>
+                  <a:prstClr val="white"/>
+                </a:solidFill>
+              </a:rPr>
+              <a:t>th</a:t>
+            </a:r>
+            <a:r>
+              <a:rPr lang="en-US" sz="1000" dirty="0" smtClean="0">
+                <a:solidFill>
+                  <a:prstClr val="white"/>
+                </a:solidFill>
+              </a:rPr>
+              <a:t> </a:t>
+            </a:r>
+            <a:r>
+              <a:rPr lang="en-US" sz="1000" dirty="0" err="1" smtClean="0">
+                <a:solidFill>
+                  <a:prstClr val="white"/>
+                </a:solidFill>
+              </a:rPr>
+              <a:t>colspan</a:t>
+            </a:r>
+            <a:r>
+              <a:rPr lang="en-US" sz="1000" dirty="0" smtClean="0">
+                <a:solidFill>
+                  <a:prstClr val="white"/>
+                </a:solidFill>
+              </a:rPr>
+              <a:t>=2&gt;&lt;strong&gt;INITIAL ISSUE&lt;/strong&gt;&lt;/</a:t>
+            </a:r>
+            <a:r>
+              <a:rPr lang="en-US" sz="1000" dirty="0" err="1" smtClean="0">
+                <a:solidFill>
+                  <a:prstClr val="white"/>
+                </a:solidFill>
+              </a:rPr>
+              <a:t>th</a:t>
+            </a:r>
+            <a:r>
+              <a:rPr lang="en-US" sz="1000" dirty="0" smtClean="0">
+                <a:solidFill>
+                  <a:prstClr val="white"/>
+                </a:solidFill>
+              </a:rPr>
+              <a:t>&gt;</a:t>
+            </a:r>
+          </a:p>
+          <a:p>
+            <a:r>
+              <a:rPr lang="en-US" sz="1000" dirty="0" smtClean="0">
+                <a:solidFill>
+                  <a:prstClr val="white"/>
+                </a:solidFill>
+              </a:rPr>
+              <a:t>&lt;/</a:t>
+            </a:r>
+            <a:r>
+              <a:rPr lang="en-US" sz="1000" dirty="0" err="1" smtClean="0">
+                <a:solidFill>
+                  <a:prstClr val="white"/>
+                </a:solidFill>
+              </a:rPr>
+              <a:t>tr</a:t>
+            </a:r>
+            <a:r>
+              <a:rPr lang="en-US" sz="1000" dirty="0" smtClean="0">
+                <a:solidFill>
+                  <a:prstClr val="white"/>
+                </a:solidFill>
+              </a:rPr>
+              <a:t>&gt;</a:t>
+            </a:r>
+          </a:p>
+          <a:p>
+            <a:r>
+              <a:rPr lang="en-US" sz="1000" dirty="0" smtClean="0">
+                <a:solidFill>
+                  <a:prstClr val="white"/>
+                </a:solidFill>
+              </a:rPr>
+              <a:t>&lt;</a:t>
+            </a:r>
+            <a:r>
+              <a:rPr lang="en-US" sz="1000" dirty="0" err="1" smtClean="0">
+                <a:solidFill>
+                  <a:prstClr val="white"/>
+                </a:solidFill>
+              </a:rPr>
+              <a:t>tr</a:t>
+            </a:r>
+            <a:r>
+              <a:rPr lang="en-US" sz="1000" dirty="0" smtClean="0">
+                <a:solidFill>
+                  <a:prstClr val="white"/>
+                </a:solidFill>
+              </a:rPr>
+              <a:t>&gt;</a:t>
+            </a:r>
+          </a:p>
+          <a:p>
+            <a:r>
+              <a:rPr lang="en-US" sz="1000" dirty="0" smtClean="0">
+                <a:solidFill>
+                  <a:prstClr val="white"/>
+                </a:solidFill>
+              </a:rPr>
+              <a:t>&lt;td width=100%&gt;{{ticket.ticket_field_102110}}&lt;/td&gt;&lt;</a:t>
+            </a:r>
+            <a:r>
+              <a:rPr lang="en-US" sz="1000" dirty="0" err="1" smtClean="0">
+                <a:solidFill>
+                  <a:prstClr val="white"/>
+                </a:solidFill>
+              </a:rPr>
+              <a:t>br</a:t>
+            </a:r>
+            <a:r>
+              <a:rPr lang="en-US" sz="1000" dirty="0" smtClean="0">
+                <a:solidFill>
+                  <a:prstClr val="white"/>
+                </a:solidFill>
+              </a:rPr>
+              <a:t>/&gt;</a:t>
+            </a:r>
+          </a:p>
+          <a:p>
+            <a:r>
+              <a:rPr lang="en-US" sz="1000" dirty="0" smtClean="0">
+                <a:solidFill>
+                  <a:prstClr val="white"/>
+                </a:solidFill>
+              </a:rPr>
+              <a:t>&lt;/</a:t>
+            </a:r>
+            <a:r>
+              <a:rPr lang="en-US" sz="1000" dirty="0" err="1" smtClean="0">
+                <a:solidFill>
+                  <a:prstClr val="white"/>
+                </a:solidFill>
+              </a:rPr>
+              <a:t>tr</a:t>
+            </a:r>
+            <a:r>
+              <a:rPr lang="en-US" sz="1000" dirty="0" smtClean="0">
+                <a:solidFill>
+                  <a:prstClr val="white"/>
+                </a:solidFill>
+              </a:rPr>
+              <a:t>&gt;</a:t>
+            </a:r>
+          </a:p>
+          <a:p>
+            <a:r>
+              <a:rPr lang="en-US" sz="1000" dirty="0" smtClean="0">
+                <a:solidFill>
+                  <a:prstClr val="white"/>
+                </a:solidFill>
+              </a:rPr>
+              <a:t>&lt;</a:t>
+            </a:r>
+            <a:r>
+              <a:rPr lang="en-US" sz="1000" dirty="0" err="1" smtClean="0">
+                <a:solidFill>
+                  <a:prstClr val="white"/>
+                </a:solidFill>
+              </a:rPr>
+              <a:t>tr</a:t>
+            </a:r>
+            <a:r>
+              <a:rPr lang="en-US" sz="1000" dirty="0" smtClean="0">
+                <a:solidFill>
+                  <a:prstClr val="white"/>
+                </a:solidFill>
+              </a:rPr>
+              <a:t>&gt;</a:t>
+            </a:r>
+          </a:p>
+          <a:p>
+            <a:r>
+              <a:rPr lang="en-US" sz="1000" dirty="0" smtClean="0">
+                <a:solidFill>
+                  <a:prstClr val="white"/>
+                </a:solidFill>
+              </a:rPr>
+              <a:t>&lt;</a:t>
+            </a:r>
+            <a:r>
+              <a:rPr lang="en-US" sz="1000" dirty="0" err="1" smtClean="0">
+                <a:solidFill>
+                  <a:prstClr val="white"/>
+                </a:solidFill>
+              </a:rPr>
+              <a:t>th</a:t>
+            </a:r>
+            <a:r>
+              <a:rPr lang="en-US" sz="1000" dirty="0" smtClean="0">
+                <a:solidFill>
+                  <a:prstClr val="white"/>
+                </a:solidFill>
+              </a:rPr>
+              <a:t> </a:t>
+            </a:r>
+            <a:r>
+              <a:rPr lang="en-US" sz="1000" dirty="0" err="1" smtClean="0">
+                <a:solidFill>
+                  <a:prstClr val="white"/>
+                </a:solidFill>
+              </a:rPr>
+              <a:t>colspan</a:t>
+            </a:r>
+            <a:r>
+              <a:rPr lang="en-US" sz="1000" dirty="0" smtClean="0">
+                <a:solidFill>
+                  <a:prstClr val="white"/>
+                </a:solidFill>
+              </a:rPr>
+              <a:t>=4&gt;&lt;strong&gt;SOLUTION TAKEN&lt;/strong&gt;&lt;/</a:t>
+            </a:r>
+            <a:r>
+              <a:rPr lang="en-US" sz="1000" dirty="0" err="1" smtClean="0">
+                <a:solidFill>
+                  <a:prstClr val="white"/>
+                </a:solidFill>
+              </a:rPr>
+              <a:t>th</a:t>
+            </a:r>
+            <a:r>
+              <a:rPr lang="en-US" sz="1000" dirty="0" smtClean="0">
+                <a:solidFill>
+                  <a:prstClr val="white"/>
+                </a:solidFill>
+              </a:rPr>
+              <a:t>&gt;</a:t>
+            </a:r>
+          </a:p>
+          <a:p>
+            <a:r>
+              <a:rPr lang="en-US" sz="1000" dirty="0" smtClean="0">
+                <a:solidFill>
+                  <a:prstClr val="white"/>
+                </a:solidFill>
+              </a:rPr>
+              <a:t>&lt;/</a:t>
+            </a:r>
+            <a:r>
+              <a:rPr lang="en-US" sz="1000" dirty="0" err="1" smtClean="0">
+                <a:solidFill>
+                  <a:prstClr val="white"/>
+                </a:solidFill>
+              </a:rPr>
+              <a:t>tr</a:t>
+            </a:r>
+            <a:r>
+              <a:rPr lang="en-US" sz="1000" dirty="0" smtClean="0">
+                <a:solidFill>
+                  <a:prstClr val="white"/>
+                </a:solidFill>
+              </a:rPr>
+              <a:t>&gt;</a:t>
+            </a:r>
+          </a:p>
+          <a:p>
+            <a:r>
+              <a:rPr lang="en-US" sz="1000" dirty="0" smtClean="0">
+                <a:solidFill>
+                  <a:prstClr val="white"/>
+                </a:solidFill>
+              </a:rPr>
+              <a:t>&lt;</a:t>
+            </a:r>
+            <a:r>
+              <a:rPr lang="en-US" sz="1000" dirty="0" err="1" smtClean="0">
+                <a:solidFill>
+                  <a:prstClr val="white"/>
+                </a:solidFill>
+              </a:rPr>
+              <a:t>tr</a:t>
+            </a:r>
+            <a:r>
+              <a:rPr lang="en-US" sz="1000" dirty="0" smtClean="0">
+                <a:solidFill>
+                  <a:prstClr val="white"/>
+                </a:solidFill>
+              </a:rPr>
+              <a:t>&gt;</a:t>
+            </a:r>
+          </a:p>
+          <a:p>
+            <a:r>
+              <a:rPr lang="en-US" sz="1000" dirty="0" smtClean="0">
+                <a:solidFill>
+                  <a:prstClr val="white"/>
+                </a:solidFill>
+              </a:rPr>
+              <a:t>&lt;td   height='120px' id='solution'&gt;&lt;/td&gt;</a:t>
+            </a:r>
+          </a:p>
+          <a:p>
+            <a:r>
+              <a:rPr lang="en-US" sz="1000" dirty="0" smtClean="0">
+                <a:solidFill>
+                  <a:prstClr val="white"/>
+                </a:solidFill>
+              </a:rPr>
+              <a:t>&lt;td   height='120px' id='solution1'&gt;&lt;/td&gt;</a:t>
+            </a:r>
+          </a:p>
+          <a:p>
+            <a:r>
+              <a:rPr lang="en-US" sz="1000" dirty="0" smtClean="0">
+                <a:solidFill>
+                  <a:prstClr val="white"/>
+                </a:solidFill>
+              </a:rPr>
+              <a:t>&lt;/</a:t>
+            </a:r>
+            <a:r>
+              <a:rPr lang="en-US" sz="1000" dirty="0" err="1" smtClean="0">
+                <a:solidFill>
+                  <a:prstClr val="white"/>
+                </a:solidFill>
+              </a:rPr>
+              <a:t>tr</a:t>
+            </a:r>
+            <a:r>
+              <a:rPr lang="en-US" sz="1000" dirty="0" smtClean="0">
+                <a:solidFill>
+                  <a:prstClr val="white"/>
+                </a:solidFill>
+              </a:rPr>
+              <a:t>&gt;</a:t>
+            </a:r>
+          </a:p>
+          <a:p>
+            <a:r>
+              <a:rPr lang="en-US" sz="1000" dirty="0" smtClean="0">
+                <a:solidFill>
+                  <a:prstClr val="white"/>
+                </a:solidFill>
+              </a:rPr>
+              <a:t>&lt;</a:t>
+            </a:r>
+            <a:r>
+              <a:rPr lang="en-US" sz="1000" dirty="0" err="1" smtClean="0">
+                <a:solidFill>
+                  <a:prstClr val="white"/>
+                </a:solidFill>
+              </a:rPr>
+              <a:t>tr</a:t>
+            </a:r>
+            <a:r>
+              <a:rPr lang="en-US" sz="1000" dirty="0" smtClean="0">
+                <a:solidFill>
+                  <a:prstClr val="white"/>
+                </a:solidFill>
+              </a:rPr>
+              <a:t>&gt;</a:t>
+            </a:r>
+          </a:p>
+          <a:p>
+            <a:r>
+              <a:rPr lang="en-US" sz="1000" dirty="0" smtClean="0">
+                <a:solidFill>
+                  <a:prstClr val="white"/>
+                </a:solidFill>
+              </a:rPr>
+              <a:t>&lt;</a:t>
+            </a:r>
+            <a:r>
+              <a:rPr lang="en-US" sz="1000" dirty="0" err="1" smtClean="0">
+                <a:solidFill>
+                  <a:prstClr val="white"/>
+                </a:solidFill>
+              </a:rPr>
+              <a:t>th</a:t>
+            </a:r>
+            <a:r>
+              <a:rPr lang="en-US" sz="1000" dirty="0" smtClean="0">
+                <a:solidFill>
+                  <a:prstClr val="white"/>
+                </a:solidFill>
+              </a:rPr>
+              <a:t> </a:t>
+            </a:r>
+            <a:r>
+              <a:rPr lang="en-US" sz="1000" dirty="0" err="1" smtClean="0">
+                <a:solidFill>
+                  <a:prstClr val="white"/>
+                </a:solidFill>
+              </a:rPr>
+              <a:t>colspan</a:t>
+            </a:r>
+            <a:r>
+              <a:rPr lang="en-US" sz="1000" dirty="0" smtClean="0">
+                <a:solidFill>
+                  <a:prstClr val="white"/>
+                </a:solidFill>
+              </a:rPr>
+              <a:t>=2&gt;&lt;strong&gt;SIGNATURE INDICATES AGREEMENT&lt;/strong&gt;&lt;/</a:t>
+            </a:r>
+            <a:r>
+              <a:rPr lang="en-US" sz="1000" dirty="0" err="1" smtClean="0">
+                <a:solidFill>
+                  <a:prstClr val="white"/>
+                </a:solidFill>
+              </a:rPr>
+              <a:t>th</a:t>
+            </a:r>
+            <a:r>
+              <a:rPr lang="en-US" sz="1000" dirty="0" smtClean="0">
+                <a:solidFill>
+                  <a:prstClr val="white"/>
+                </a:solidFill>
+              </a:rPr>
+              <a:t>&gt;</a:t>
+            </a:r>
+          </a:p>
+          <a:p>
+            <a:r>
+              <a:rPr lang="en-US" sz="1000" dirty="0" smtClean="0">
+                <a:solidFill>
+                  <a:prstClr val="white"/>
+                </a:solidFill>
+              </a:rPr>
+              <a:t>&lt;/</a:t>
+            </a:r>
+            <a:r>
+              <a:rPr lang="en-US" sz="1000" dirty="0" err="1" smtClean="0">
+                <a:solidFill>
+                  <a:prstClr val="white"/>
+                </a:solidFill>
+              </a:rPr>
+              <a:t>tr</a:t>
+            </a:r>
+            <a:r>
+              <a:rPr lang="en-US" sz="1000" dirty="0" smtClean="0">
+                <a:solidFill>
+                  <a:prstClr val="white"/>
+                </a:solidFill>
+              </a:rPr>
+              <a:t>&gt;</a:t>
+            </a:r>
+          </a:p>
+          <a:p>
+            <a:r>
+              <a:rPr lang="en-US" sz="1000" dirty="0" smtClean="0">
+                <a:solidFill>
+                  <a:prstClr val="white"/>
+                </a:solidFill>
+              </a:rPr>
+              <a:t>&lt;</a:t>
+            </a:r>
+            <a:r>
+              <a:rPr lang="en-US" sz="1000" dirty="0" err="1" smtClean="0">
+                <a:solidFill>
+                  <a:prstClr val="white"/>
+                </a:solidFill>
+              </a:rPr>
+              <a:t>tr</a:t>
+            </a:r>
+            <a:r>
+              <a:rPr lang="en-US" sz="1000" dirty="0" smtClean="0">
+                <a:solidFill>
+                  <a:prstClr val="white"/>
+                </a:solidFill>
+              </a:rPr>
+              <a:t>&gt;</a:t>
+            </a:r>
+          </a:p>
+          <a:p>
+            <a:r>
+              <a:rPr lang="en-US" sz="1000" dirty="0" smtClean="0">
+                <a:solidFill>
+                  <a:prstClr val="white"/>
+                </a:solidFill>
+              </a:rPr>
+              <a:t>&lt;td&gt;&lt;</a:t>
+            </a:r>
+            <a:r>
+              <a:rPr lang="en-US" sz="1000" dirty="0" err="1" smtClean="0">
+                <a:solidFill>
+                  <a:prstClr val="white"/>
+                </a:solidFill>
+              </a:rPr>
+              <a:t>br</a:t>
+            </a:r>
+            <a:r>
+              <a:rPr lang="en-US" sz="1000" dirty="0" smtClean="0">
+                <a:solidFill>
+                  <a:prstClr val="white"/>
+                </a:solidFill>
+              </a:rPr>
+              <a:t> /&gt;&lt;</a:t>
+            </a:r>
+            <a:r>
+              <a:rPr lang="en-US" sz="1000" dirty="0" err="1" smtClean="0">
+                <a:solidFill>
+                  <a:prstClr val="white"/>
+                </a:solidFill>
+              </a:rPr>
+              <a:t>br</a:t>
+            </a:r>
+            <a:r>
+              <a:rPr lang="en-US" sz="1000" dirty="0" smtClean="0">
+                <a:solidFill>
+                  <a:prstClr val="white"/>
+                </a:solidFill>
+              </a:rPr>
+              <a:t> /&gt;&lt;</a:t>
+            </a:r>
+            <a:r>
+              <a:rPr lang="en-US" sz="1000" dirty="0" err="1" smtClean="0">
+                <a:solidFill>
+                  <a:prstClr val="white"/>
+                </a:solidFill>
+              </a:rPr>
+              <a:t>iframe</a:t>
+            </a:r>
+            <a:r>
+              <a:rPr lang="en-US" sz="1000" dirty="0" smtClean="0">
+                <a:solidFill>
+                  <a:prstClr val="white"/>
+                </a:solidFill>
+              </a:rPr>
+              <a:t> </a:t>
+            </a:r>
+            <a:r>
+              <a:rPr lang="en-US" sz="1000" dirty="0" err="1" smtClean="0">
+                <a:solidFill>
+                  <a:prstClr val="white"/>
+                </a:solidFill>
+              </a:rPr>
+              <a:t>src</a:t>
+            </a:r>
+            <a:r>
+              <a:rPr lang="en-US" sz="1000" dirty="0" smtClean="0">
+                <a:solidFill>
+                  <a:prstClr val="white"/>
+                </a:solidFill>
+              </a:rPr>
+              <a:t>='http://www.dreamcpu.com/signature.html' height='90px' width='275px' </a:t>
+            </a:r>
+            <a:r>
+              <a:rPr lang="en-US" sz="1000" dirty="0" err="1" smtClean="0">
+                <a:solidFill>
+                  <a:prstClr val="white"/>
+                </a:solidFill>
+              </a:rPr>
+              <a:t>frameborder</a:t>
+            </a:r>
+            <a:r>
+              <a:rPr lang="en-US" sz="1000" dirty="0" smtClean="0">
+                <a:solidFill>
+                  <a:prstClr val="white"/>
+                </a:solidFill>
+              </a:rPr>
+              <a:t>='0'&gt;</a:t>
+            </a:r>
+          </a:p>
+          <a:p>
+            <a:r>
+              <a:rPr lang="en-US" sz="1000" dirty="0" smtClean="0">
+                <a:solidFill>
+                  <a:prstClr val="white"/>
+                </a:solidFill>
+              </a:rPr>
+              <a:t>  &lt;p&gt;Your browser does not support </a:t>
+            </a:r>
+            <a:r>
+              <a:rPr lang="en-US" sz="1000" dirty="0" err="1" smtClean="0">
+                <a:solidFill>
+                  <a:prstClr val="white"/>
+                </a:solidFill>
+              </a:rPr>
+              <a:t>iframes</a:t>
+            </a:r>
+            <a:r>
+              <a:rPr lang="en-US" sz="1000" dirty="0" smtClean="0">
+                <a:solidFill>
+                  <a:prstClr val="white"/>
+                </a:solidFill>
+              </a:rPr>
+              <a:t>.&lt;/p&gt;</a:t>
+            </a:r>
+          </a:p>
+          <a:p>
+            <a:r>
+              <a:rPr lang="en-US" sz="1000" dirty="0" smtClean="0">
+                <a:solidFill>
+                  <a:prstClr val="white"/>
+                </a:solidFill>
+              </a:rPr>
+              <a:t>&lt;/</a:t>
+            </a:r>
+            <a:r>
+              <a:rPr lang="en-US" sz="1000" dirty="0" err="1" smtClean="0">
+                <a:solidFill>
+                  <a:prstClr val="white"/>
+                </a:solidFill>
+              </a:rPr>
+              <a:t>iframe</a:t>
+            </a:r>
+            <a:r>
+              <a:rPr lang="en-US" sz="1000" dirty="0" smtClean="0">
+                <a:solidFill>
+                  <a:prstClr val="white"/>
+                </a:solidFill>
+              </a:rPr>
+              <a:t>&gt;&lt;</a:t>
+            </a:r>
+            <a:r>
+              <a:rPr lang="en-US" sz="1000" dirty="0" err="1" smtClean="0">
+                <a:solidFill>
+                  <a:prstClr val="white"/>
+                </a:solidFill>
+              </a:rPr>
+              <a:t>br</a:t>
+            </a:r>
+            <a:r>
+              <a:rPr lang="en-US" sz="1000" dirty="0" smtClean="0">
+                <a:solidFill>
+                  <a:prstClr val="white"/>
+                </a:solidFill>
+              </a:rPr>
+              <a:t> /&gt;{{ticket.requester.name}}&lt;/td&gt;</a:t>
+            </a:r>
+          </a:p>
+          <a:p>
+            <a:r>
+              <a:rPr lang="en-US" sz="1000" dirty="0" smtClean="0">
+                <a:solidFill>
+                  <a:prstClr val="white"/>
+                </a:solidFill>
+              </a:rPr>
+              <a:t>&lt;td&gt;&lt;</a:t>
+            </a:r>
+            <a:r>
+              <a:rPr lang="en-US" sz="1000" dirty="0" err="1" smtClean="0">
+                <a:solidFill>
+                  <a:prstClr val="white"/>
+                </a:solidFill>
+              </a:rPr>
+              <a:t>br</a:t>
+            </a:r>
+            <a:r>
+              <a:rPr lang="en-US" sz="1000" dirty="0" smtClean="0">
+                <a:solidFill>
+                  <a:prstClr val="white"/>
+                </a:solidFill>
+              </a:rPr>
+              <a:t> /&gt;&lt;</a:t>
+            </a:r>
+            <a:r>
+              <a:rPr lang="en-US" sz="1000" dirty="0" err="1" smtClean="0">
+                <a:solidFill>
+                  <a:prstClr val="white"/>
+                </a:solidFill>
+              </a:rPr>
+              <a:t>br</a:t>
+            </a:r>
+            <a:r>
+              <a:rPr lang="en-US" sz="1000" dirty="0" smtClean="0">
+                <a:solidFill>
+                  <a:prstClr val="white"/>
+                </a:solidFill>
+              </a:rPr>
+              <a:t> /&gt;&lt;</a:t>
+            </a:r>
+            <a:r>
+              <a:rPr lang="en-US" sz="1000" dirty="0" err="1" smtClean="0">
+                <a:solidFill>
+                  <a:prstClr val="white"/>
+                </a:solidFill>
+              </a:rPr>
+              <a:t>hr</a:t>
+            </a:r>
+            <a:r>
+              <a:rPr lang="en-US" sz="1000" dirty="0" smtClean="0">
+                <a:solidFill>
+                  <a:prstClr val="white"/>
+                </a:solidFill>
+              </a:rPr>
+              <a:t>&gt;Date&lt;/td&gt;&lt;/</a:t>
+            </a:r>
+            <a:r>
+              <a:rPr lang="en-US" sz="1000" dirty="0" err="1" smtClean="0">
+                <a:solidFill>
+                  <a:prstClr val="white"/>
+                </a:solidFill>
+              </a:rPr>
+              <a:t>tr</a:t>
+            </a:r>
+            <a:r>
+              <a:rPr lang="en-US" sz="1000" dirty="0" smtClean="0">
+                <a:solidFill>
+                  <a:prstClr val="white"/>
+                </a:solidFill>
+              </a:rPr>
+              <a:t>&gt;</a:t>
+            </a:r>
+          </a:p>
+          <a:p>
+            <a:r>
+              <a:rPr lang="en-US" sz="1000" dirty="0" smtClean="0">
+                <a:solidFill>
+                  <a:prstClr val="white"/>
+                </a:solidFill>
+              </a:rPr>
+              <a:t>&lt;</a:t>
+            </a:r>
+            <a:r>
+              <a:rPr lang="en-US" sz="1000" dirty="0" err="1" smtClean="0">
+                <a:solidFill>
+                  <a:prstClr val="white"/>
+                </a:solidFill>
+              </a:rPr>
+              <a:t>tr</a:t>
+            </a:r>
+            <a:r>
+              <a:rPr lang="en-US" sz="1000" dirty="0" smtClean="0">
+                <a:solidFill>
+                  <a:prstClr val="white"/>
+                </a:solidFill>
+              </a:rPr>
+              <a:t>&gt;</a:t>
+            </a:r>
+          </a:p>
+          <a:p>
+            <a:r>
+              <a:rPr lang="en-US" sz="1000" dirty="0" smtClean="0">
+                <a:solidFill>
+                  <a:prstClr val="white"/>
+                </a:solidFill>
+              </a:rPr>
+              <a:t>&lt;td&gt;&lt;</a:t>
+            </a:r>
+            <a:r>
+              <a:rPr lang="en-US" sz="1000" dirty="0" err="1" smtClean="0">
+                <a:solidFill>
+                  <a:prstClr val="white"/>
+                </a:solidFill>
+              </a:rPr>
+              <a:t>br</a:t>
+            </a:r>
+            <a:r>
+              <a:rPr lang="en-US" sz="1000" dirty="0" smtClean="0">
+                <a:solidFill>
+                  <a:prstClr val="white"/>
+                </a:solidFill>
+              </a:rPr>
+              <a:t> /&gt;&lt;</a:t>
+            </a:r>
+            <a:r>
+              <a:rPr lang="en-US" sz="1000" dirty="0" err="1" smtClean="0">
+                <a:solidFill>
+                  <a:prstClr val="white"/>
+                </a:solidFill>
+              </a:rPr>
+              <a:t>br</a:t>
+            </a:r>
+            <a:r>
+              <a:rPr lang="en-US" sz="1000" dirty="0" smtClean="0">
+                <a:solidFill>
+                  <a:prstClr val="white"/>
+                </a:solidFill>
+              </a:rPr>
+              <a:t> /&gt;&lt;</a:t>
+            </a:r>
+            <a:r>
+              <a:rPr lang="en-US" sz="1000" dirty="0" err="1" smtClean="0">
+                <a:solidFill>
+                  <a:prstClr val="white"/>
+                </a:solidFill>
+              </a:rPr>
+              <a:t>hr</a:t>
+            </a:r>
+            <a:r>
+              <a:rPr lang="en-US" sz="1000" dirty="0" smtClean="0">
+                <a:solidFill>
+                  <a:prstClr val="white"/>
+                </a:solidFill>
+              </a:rPr>
+              <a:t>&gt;Technician:{{current_user.name}}&lt;/td&gt;</a:t>
+            </a:r>
+          </a:p>
+          <a:p>
+            <a:r>
+              <a:rPr lang="en-US" sz="1000" dirty="0" smtClean="0">
+                <a:solidFill>
+                  <a:prstClr val="white"/>
+                </a:solidFill>
+              </a:rPr>
+              <a:t>&lt;td&gt;&lt;</a:t>
+            </a:r>
+            <a:r>
+              <a:rPr lang="en-US" sz="1000" dirty="0" err="1" smtClean="0">
+                <a:solidFill>
+                  <a:prstClr val="white"/>
+                </a:solidFill>
+              </a:rPr>
+              <a:t>br</a:t>
+            </a:r>
+            <a:r>
+              <a:rPr lang="en-US" sz="1000" dirty="0" smtClean="0">
+                <a:solidFill>
+                  <a:prstClr val="white"/>
+                </a:solidFill>
+              </a:rPr>
+              <a:t> /&gt;&lt;</a:t>
+            </a:r>
+            <a:r>
+              <a:rPr lang="en-US" sz="1000" dirty="0" err="1" smtClean="0">
+                <a:solidFill>
+                  <a:prstClr val="white"/>
+                </a:solidFill>
+              </a:rPr>
+              <a:t>br</a:t>
+            </a:r>
+            <a:r>
+              <a:rPr lang="en-US" sz="1000" dirty="0" smtClean="0">
+                <a:solidFill>
+                  <a:prstClr val="white"/>
+                </a:solidFill>
+              </a:rPr>
+              <a:t> /&gt;&lt;</a:t>
+            </a:r>
+            <a:r>
+              <a:rPr lang="en-US" sz="1000" dirty="0" err="1" smtClean="0">
+                <a:solidFill>
+                  <a:prstClr val="white"/>
+                </a:solidFill>
+              </a:rPr>
+              <a:t>hr</a:t>
+            </a:r>
+            <a:r>
+              <a:rPr lang="en-US" sz="1000" dirty="0" smtClean="0">
+                <a:solidFill>
+                  <a:prstClr val="white"/>
+                </a:solidFill>
+              </a:rPr>
+              <a:t>&gt;Date&lt;/td&gt;</a:t>
+            </a:r>
+          </a:p>
+          <a:p>
+            <a:r>
+              <a:rPr lang="en-US" sz="1000" dirty="0" smtClean="0">
+                <a:solidFill>
+                  <a:prstClr val="white"/>
+                </a:solidFill>
+              </a:rPr>
+              <a:t>&lt;/</a:t>
+            </a:r>
+            <a:r>
+              <a:rPr lang="en-US" sz="1000" dirty="0" err="1" smtClean="0">
+                <a:solidFill>
+                  <a:prstClr val="white"/>
+                </a:solidFill>
+              </a:rPr>
+              <a:t>tr</a:t>
+            </a:r>
+            <a:r>
+              <a:rPr lang="en-US" sz="1000" dirty="0" smtClean="0">
+                <a:solidFill>
+                  <a:prstClr val="white"/>
+                </a:solidFill>
+              </a:rPr>
+              <a:t>&gt;</a:t>
+            </a:r>
+          </a:p>
+          <a:p>
+            <a:r>
+              <a:rPr lang="en-US" sz="1000" dirty="0" smtClean="0">
+                <a:solidFill>
+                  <a:prstClr val="white"/>
+                </a:solidFill>
+              </a:rPr>
+              <a:t>&lt;/table&gt;"&gt;</a:t>
+            </a:r>
+          </a:p>
+          <a:p>
+            <a:r>
+              <a:rPr lang="en-US" sz="1000" dirty="0" smtClean="0">
+                <a:solidFill>
+                  <a:prstClr val="white"/>
+                </a:solidFill>
+              </a:rPr>
+              <a:t>  &lt;input type=button value="Ticket Signing Sheet"</a:t>
+            </a:r>
+          </a:p>
+          <a:p>
+            <a:r>
+              <a:rPr lang="en-US" sz="1000" dirty="0" err="1" smtClean="0">
+                <a:solidFill>
+                  <a:prstClr val="white"/>
+                </a:solidFill>
+              </a:rPr>
+              <a:t>onClick</a:t>
+            </a:r>
+            <a:r>
+              <a:rPr lang="en-US" sz="1000" dirty="0" smtClean="0">
+                <a:solidFill>
+                  <a:prstClr val="white"/>
+                </a:solidFill>
+              </a:rPr>
+              <a:t>="</a:t>
+            </a:r>
+            <a:r>
+              <a:rPr lang="en-US" sz="1000" dirty="0" err="1" smtClean="0">
+                <a:solidFill>
+                  <a:prstClr val="white"/>
+                </a:solidFill>
+              </a:rPr>
+              <a:t>writeConsole</a:t>
+            </a:r>
+            <a:r>
+              <a:rPr lang="en-US" sz="1000" dirty="0" smtClean="0">
+                <a:solidFill>
+                  <a:prstClr val="white"/>
+                </a:solidFill>
+              </a:rPr>
+              <a:t>(</a:t>
+            </a:r>
+            <a:r>
+              <a:rPr lang="en-US" sz="1000" dirty="0" err="1" smtClean="0">
+                <a:solidFill>
+                  <a:prstClr val="white"/>
+                </a:solidFill>
+              </a:rPr>
+              <a:t>this.form.userInput.value</a:t>
+            </a:r>
+            <a:r>
+              <a:rPr lang="en-US" sz="1000" dirty="0" smtClean="0">
+                <a:solidFill>
+                  <a:prstClr val="white"/>
+                </a:solidFill>
+              </a:rPr>
+              <a:t>)"</a:t>
+            </a:r>
+          </a:p>
+          <a:p>
+            <a:r>
+              <a:rPr lang="en-US" sz="1000" dirty="0" smtClean="0">
+                <a:solidFill>
+                  <a:prstClr val="white"/>
+                </a:solidFill>
+              </a:rPr>
+              <a:t>&gt;</a:t>
+            </a:r>
+          </a:p>
+          <a:p>
+            <a:r>
+              <a:rPr lang="en-US" sz="1000" dirty="0" smtClean="0">
+                <a:solidFill>
+                  <a:prstClr val="white"/>
+                </a:solidFill>
+              </a:rPr>
+              <a:t>&lt;/form&gt;</a:t>
+            </a:r>
+            <a:endParaRPr lang="en-US" sz="1000" dirty="0">
+              <a:solidFill>
+                <a:prstClr val="white"/>
+              </a:solidFill>
+            </a:endParaRPr>
+          </a:p>
+        </p:txBody>
+      </p:sp>
+      <p:sp>
+        <p:nvSpPr>
+          <p:cNvPr id="7" name="Rectangle 6"/>
+          <p:cNvSpPr/>
+          <p:nvPr/>
+        </p:nvSpPr>
+        <p:spPr>
+          <a:xfrm>
+            <a:off x="2971800" y="2201567"/>
+            <a:ext cx="2743200" cy="4678204"/>
+          </a:xfrm>
+          <a:prstGeom prst="rect">
+            <a:avLst/>
+          </a:prstGeom>
+        </p:spPr>
+        <p:style>
+          <a:lnRef idx="0">
+            <a:schemeClr val="accent2"/>
+          </a:lnRef>
+          <a:fillRef idx="1003">
+            <a:schemeClr val="dk2"/>
+          </a:fillRef>
+          <a:effectRef idx="3">
+            <a:schemeClr val="accent2"/>
+          </a:effectRef>
+          <a:fontRef idx="minor">
+            <a:schemeClr val="lt1"/>
+          </a:fontRef>
+        </p:style>
+        <p:txBody>
+          <a:bodyPr wrap="square">
+            <a:spAutoFit/>
+          </a:bodyPr>
+          <a:lstStyle/>
+          <a:p>
+            <a:r>
+              <a:rPr lang="en-US" dirty="0" smtClean="0">
+                <a:solidFill>
+                  <a:prstClr val="white"/>
+                </a:solidFill>
+              </a:rPr>
+              <a:t> </a:t>
+            </a:r>
+            <a:r>
+              <a:rPr lang="en-US" sz="1000" dirty="0" smtClean="0">
+                <a:solidFill>
+                  <a:prstClr val="white"/>
+                </a:solidFill>
+              </a:rPr>
+              <a:t>+'&lt;/body&gt;&lt;/html&gt;'</a:t>
+            </a:r>
+          </a:p>
+          <a:p>
+            <a:r>
+              <a:rPr lang="en-US" sz="1000" dirty="0" smtClean="0">
+                <a:solidFill>
+                  <a:prstClr val="white"/>
+                </a:solidFill>
+              </a:rPr>
+              <a:t> )</a:t>
+            </a:r>
+          </a:p>
+          <a:p>
+            <a:r>
+              <a:rPr lang="en-US" sz="1000" dirty="0" smtClean="0">
+                <a:solidFill>
+                  <a:prstClr val="white"/>
+                </a:solidFill>
+              </a:rPr>
+              <a:t> </a:t>
+            </a:r>
+            <a:r>
+              <a:rPr lang="en-US" sz="1000" dirty="0" err="1" smtClean="0">
+                <a:solidFill>
+                  <a:prstClr val="white"/>
+                </a:solidFill>
+              </a:rPr>
+              <a:t>top.consoleRef.document.close</a:t>
+            </a:r>
+            <a:r>
+              <a:rPr lang="en-US" sz="1000" dirty="0" smtClean="0">
+                <a:solidFill>
+                  <a:prstClr val="white"/>
+                </a:solidFill>
+              </a:rPr>
+              <a:t>()</a:t>
+            </a:r>
+          </a:p>
+          <a:p>
+            <a:r>
+              <a:rPr lang="en-US" sz="1000" dirty="0" smtClean="0">
+                <a:solidFill>
+                  <a:prstClr val="white"/>
+                </a:solidFill>
+              </a:rPr>
+              <a:t>}</a:t>
+            </a:r>
+          </a:p>
+          <a:p>
+            <a:r>
+              <a:rPr lang="en-US" sz="1000" dirty="0" smtClean="0">
+                <a:solidFill>
+                  <a:prstClr val="white"/>
+                </a:solidFill>
+              </a:rPr>
+              <a:t>//--&gt;</a:t>
+            </a:r>
+          </a:p>
+          <a:p>
+            <a:r>
+              <a:rPr lang="en-US" sz="1000" dirty="0" smtClean="0">
+                <a:solidFill>
+                  <a:prstClr val="white"/>
+                </a:solidFill>
+              </a:rPr>
+              <a:t>&lt;/script&gt;</a:t>
+            </a:r>
+          </a:p>
+          <a:p>
+            <a:r>
+              <a:rPr lang="en-US" sz="1000" dirty="0" smtClean="0">
+                <a:solidFill>
+                  <a:prstClr val="white"/>
+                </a:solidFill>
+              </a:rPr>
+              <a:t>&lt;form&gt;</a:t>
+            </a:r>
+          </a:p>
+          <a:p>
+            <a:r>
+              <a:rPr lang="en-US" sz="1000" dirty="0" smtClean="0">
+                <a:solidFill>
+                  <a:prstClr val="white"/>
+                </a:solidFill>
+              </a:rPr>
+              <a:t>  &lt;input class="</a:t>
+            </a:r>
+            <a:r>
+              <a:rPr lang="en-US" sz="1000" dirty="0" err="1" smtClean="0">
+                <a:solidFill>
+                  <a:prstClr val="white"/>
+                </a:solidFill>
+              </a:rPr>
+              <a:t>createtable</a:t>
+            </a:r>
+            <a:r>
+              <a:rPr lang="en-US" sz="1000" dirty="0" smtClean="0">
+                <a:solidFill>
+                  <a:prstClr val="white"/>
+                </a:solidFill>
+              </a:rPr>
+              <a:t>"  name=</a:t>
+            </a:r>
+            <a:r>
+              <a:rPr lang="en-US" sz="1000" dirty="0" err="1" smtClean="0">
+                <a:solidFill>
+                  <a:prstClr val="white"/>
+                </a:solidFill>
+              </a:rPr>
+              <a:t>userInput</a:t>
+            </a:r>
+            <a:r>
+              <a:rPr lang="en-US" sz="1000" dirty="0" smtClean="0">
+                <a:solidFill>
+                  <a:prstClr val="white"/>
+                </a:solidFill>
+              </a:rPr>
+              <a:t> " value="&lt;table width=100% </a:t>
+            </a:r>
+            <a:r>
+              <a:rPr lang="en-US" sz="1000" dirty="0" err="1" smtClean="0">
+                <a:solidFill>
+                  <a:prstClr val="white"/>
+                </a:solidFill>
+              </a:rPr>
+              <a:t>cellpadding</a:t>
+            </a:r>
+            <a:r>
+              <a:rPr lang="en-US" sz="1000" dirty="0" smtClean="0">
+                <a:solidFill>
+                  <a:prstClr val="white"/>
+                </a:solidFill>
+              </a:rPr>
+              <a:t>=7&gt;</a:t>
+            </a:r>
+          </a:p>
+          <a:p>
+            <a:r>
+              <a:rPr lang="en-US" sz="1000" dirty="0" smtClean="0">
+                <a:solidFill>
+                  <a:prstClr val="white"/>
+                </a:solidFill>
+              </a:rPr>
+              <a:t>  &lt;</a:t>
+            </a:r>
+            <a:r>
+              <a:rPr lang="en-US" sz="1000" dirty="0" err="1" smtClean="0">
+                <a:solidFill>
+                  <a:prstClr val="white"/>
+                </a:solidFill>
+              </a:rPr>
+              <a:t>tr</a:t>
+            </a:r>
+            <a:r>
+              <a:rPr lang="en-US" sz="1000" dirty="0" smtClean="0">
+                <a:solidFill>
+                  <a:prstClr val="white"/>
+                </a:solidFill>
+              </a:rPr>
+              <a:t>&gt;</a:t>
+            </a:r>
+          </a:p>
+          <a:p>
+            <a:r>
+              <a:rPr lang="en-US" sz="1000" dirty="0" smtClean="0">
+                <a:solidFill>
+                  <a:prstClr val="white"/>
+                </a:solidFill>
+              </a:rPr>
+              <a:t>    &lt;</a:t>
+            </a:r>
+            <a:r>
+              <a:rPr lang="en-US" sz="1000" dirty="0" err="1" smtClean="0">
+                <a:solidFill>
+                  <a:prstClr val="white"/>
+                </a:solidFill>
+              </a:rPr>
+              <a:t>th</a:t>
+            </a:r>
+            <a:r>
+              <a:rPr lang="en-US" sz="1000" dirty="0" smtClean="0">
+                <a:solidFill>
+                  <a:prstClr val="white"/>
+                </a:solidFill>
+              </a:rPr>
+              <a:t> </a:t>
+            </a:r>
+            <a:r>
+              <a:rPr lang="en-US" sz="1000" dirty="0" err="1" smtClean="0">
+                <a:solidFill>
+                  <a:prstClr val="white"/>
+                </a:solidFill>
+              </a:rPr>
+              <a:t>colspan</a:t>
+            </a:r>
+            <a:r>
+              <a:rPr lang="en-US" sz="1000" dirty="0" smtClean="0">
+                <a:solidFill>
+                  <a:prstClr val="white"/>
+                </a:solidFill>
+              </a:rPr>
+              <a:t>=2&gt;CUSTOMER INFORMATION&lt;/</a:t>
+            </a:r>
+            <a:r>
+              <a:rPr lang="en-US" sz="1000" dirty="0" err="1" smtClean="0">
+                <a:solidFill>
+                  <a:prstClr val="white"/>
+                </a:solidFill>
+              </a:rPr>
+              <a:t>th</a:t>
+            </a:r>
+            <a:r>
+              <a:rPr lang="en-US" sz="1000" dirty="0" smtClean="0">
+                <a:solidFill>
+                  <a:prstClr val="white"/>
+                </a:solidFill>
+              </a:rPr>
+              <a:t>&gt;</a:t>
+            </a:r>
+          </a:p>
+          <a:p>
+            <a:r>
+              <a:rPr lang="en-US" sz="1000" dirty="0" smtClean="0">
+                <a:solidFill>
+                  <a:prstClr val="white"/>
+                </a:solidFill>
+              </a:rPr>
+              <a:t>  &lt;/</a:t>
+            </a:r>
+            <a:r>
+              <a:rPr lang="en-US" sz="1000" dirty="0" err="1" smtClean="0">
+                <a:solidFill>
+                  <a:prstClr val="white"/>
+                </a:solidFill>
+              </a:rPr>
+              <a:t>tr</a:t>
+            </a:r>
+            <a:r>
+              <a:rPr lang="en-US" sz="1000" dirty="0" smtClean="0">
+                <a:solidFill>
+                  <a:prstClr val="white"/>
+                </a:solidFill>
+              </a:rPr>
+              <a:t>&gt;</a:t>
+            </a:r>
+          </a:p>
+          <a:p>
+            <a:r>
+              <a:rPr lang="en-US" sz="1000" dirty="0" smtClean="0">
+                <a:solidFill>
+                  <a:prstClr val="white"/>
+                </a:solidFill>
+              </a:rPr>
+              <a:t>  &lt;</a:t>
+            </a:r>
+            <a:r>
+              <a:rPr lang="en-US" sz="1000" dirty="0" err="1" smtClean="0">
+                <a:solidFill>
+                  <a:prstClr val="white"/>
+                </a:solidFill>
+              </a:rPr>
+              <a:t>tr</a:t>
+            </a:r>
+            <a:r>
+              <a:rPr lang="en-US" sz="1000" dirty="0" smtClean="0">
+                <a:solidFill>
+                  <a:prstClr val="white"/>
+                </a:solidFill>
+              </a:rPr>
+              <a:t>&gt;</a:t>
+            </a:r>
+          </a:p>
+          <a:p>
+            <a:r>
+              <a:rPr lang="en-US" sz="1000" dirty="0" smtClean="0">
+                <a:solidFill>
+                  <a:prstClr val="white"/>
+                </a:solidFill>
+              </a:rPr>
+              <a:t>      &lt;td width=50%&gt;&lt;strong&gt;Name&lt;/strong&gt;: {{ticket.requester.name}}&lt;</a:t>
+            </a:r>
+            <a:r>
+              <a:rPr lang="en-US" sz="1000" dirty="0" err="1" smtClean="0">
+                <a:solidFill>
+                  <a:prstClr val="white"/>
+                </a:solidFill>
+              </a:rPr>
+              <a:t>br</a:t>
+            </a:r>
+            <a:r>
+              <a:rPr lang="en-US" sz="1000" dirty="0" smtClean="0">
+                <a:solidFill>
+                  <a:prstClr val="white"/>
+                </a:solidFill>
+              </a:rPr>
+              <a:t> /&gt;</a:t>
+            </a:r>
+          </a:p>
+          <a:p>
+            <a:r>
+              <a:rPr lang="en-US" sz="1000" dirty="0" smtClean="0">
+                <a:solidFill>
+                  <a:prstClr val="white"/>
+                </a:solidFill>
+              </a:rPr>
+              <a:t>      &lt;strong&gt;Organization&lt;/strong&gt;: {{ticket.organization.name}}&lt;/td&gt;</a:t>
+            </a:r>
+          </a:p>
+          <a:p>
+            <a:r>
+              <a:rPr lang="en-US" sz="1000" dirty="0" smtClean="0">
+                <a:solidFill>
+                  <a:prstClr val="white"/>
+                </a:solidFill>
+              </a:rPr>
+              <a:t>      &lt;td width=50% align=left&gt;&lt;strong&gt;Phone&lt;/strong&gt;: {{ticket.ticket_field_116678}}&lt;</a:t>
+            </a:r>
+            <a:r>
+              <a:rPr lang="en-US" sz="1000" dirty="0" err="1" smtClean="0">
+                <a:solidFill>
+                  <a:prstClr val="white"/>
+                </a:solidFill>
+              </a:rPr>
+              <a:t>br</a:t>
+            </a:r>
+            <a:r>
+              <a:rPr lang="en-US" sz="1000" dirty="0" smtClean="0">
+                <a:solidFill>
+                  <a:prstClr val="white"/>
+                </a:solidFill>
+              </a:rPr>
+              <a:t> /&gt;</a:t>
+            </a:r>
+          </a:p>
+          <a:p>
+            <a:r>
+              <a:rPr lang="en-US" sz="1000" dirty="0" smtClean="0">
+                <a:solidFill>
+                  <a:prstClr val="white"/>
+                </a:solidFill>
+              </a:rPr>
+              <a:t>      &lt;strong&gt;Email&lt;/strong&gt;: {{</a:t>
+            </a:r>
+            <a:r>
+              <a:rPr lang="en-US" sz="1000" dirty="0" err="1" smtClean="0">
+                <a:solidFill>
+                  <a:prstClr val="white"/>
+                </a:solidFill>
+              </a:rPr>
+              <a:t>ticket.requester.email</a:t>
+            </a:r>
+            <a:r>
+              <a:rPr lang="en-US" sz="1000" dirty="0" smtClean="0">
+                <a:solidFill>
+                  <a:prstClr val="white"/>
+                </a:solidFill>
+              </a:rPr>
+              <a:t>}}&lt;</a:t>
+            </a:r>
+            <a:r>
+              <a:rPr lang="en-US" sz="1000" dirty="0" err="1" smtClean="0">
+                <a:solidFill>
+                  <a:prstClr val="white"/>
+                </a:solidFill>
+              </a:rPr>
+              <a:t>br</a:t>
+            </a:r>
+            <a:r>
+              <a:rPr lang="en-US" sz="1000" dirty="0" smtClean="0">
+                <a:solidFill>
+                  <a:prstClr val="white"/>
+                </a:solidFill>
+              </a:rPr>
+              <a:t> /&gt;</a:t>
+            </a:r>
+          </a:p>
+          <a:p>
+            <a:r>
+              <a:rPr lang="en-US" sz="1000" dirty="0" smtClean="0">
+                <a:solidFill>
+                  <a:prstClr val="white"/>
+                </a:solidFill>
+              </a:rPr>
+              <a:t>&lt;strong&gt;Student ID&lt;/strong&gt;: {{ticket.ticket_field_21306086}}&lt;/td&gt;</a:t>
+            </a:r>
+          </a:p>
+          <a:p>
+            <a:r>
+              <a:rPr lang="en-US" sz="1000" dirty="0" smtClean="0">
+                <a:solidFill>
+                  <a:prstClr val="white"/>
+                </a:solidFill>
+              </a:rPr>
+              <a:t>  &lt;/</a:t>
+            </a:r>
+            <a:r>
+              <a:rPr lang="en-US" sz="1000" dirty="0" err="1" smtClean="0">
+                <a:solidFill>
+                  <a:prstClr val="white"/>
+                </a:solidFill>
+              </a:rPr>
+              <a:t>tr</a:t>
+            </a:r>
+            <a:r>
+              <a:rPr lang="en-US" sz="1000" dirty="0" smtClean="0">
+                <a:solidFill>
+                  <a:prstClr val="white"/>
+                </a:solidFill>
+              </a:rPr>
+              <a:t>&gt;</a:t>
+            </a:r>
+          </a:p>
+          <a:p>
+            <a:r>
+              <a:rPr lang="en-US" sz="1000" dirty="0" smtClean="0">
+                <a:solidFill>
+                  <a:prstClr val="white"/>
+                </a:solidFill>
+              </a:rPr>
+              <a:t>&lt;</a:t>
+            </a:r>
+            <a:r>
+              <a:rPr lang="en-US" sz="1000" dirty="0" err="1" smtClean="0">
+                <a:solidFill>
+                  <a:prstClr val="white"/>
+                </a:solidFill>
+              </a:rPr>
+              <a:t>tr</a:t>
+            </a:r>
+            <a:r>
+              <a:rPr lang="en-US" sz="1000" dirty="0" smtClean="0">
+                <a:solidFill>
+                  <a:prstClr val="white"/>
+                </a:solidFill>
+              </a:rPr>
+              <a:t>&gt;</a:t>
+            </a:r>
+          </a:p>
+          <a:p>
+            <a:r>
+              <a:rPr lang="en-US" sz="1000" dirty="0" smtClean="0">
+                <a:solidFill>
+                  <a:prstClr val="white"/>
+                </a:solidFill>
+              </a:rPr>
+              <a:t>&lt;</a:t>
+            </a:r>
+            <a:r>
+              <a:rPr lang="en-US" sz="1000" dirty="0" err="1" smtClean="0">
+                <a:solidFill>
+                  <a:prstClr val="white"/>
+                </a:solidFill>
+              </a:rPr>
+              <a:t>th</a:t>
+            </a:r>
+            <a:r>
+              <a:rPr lang="en-US" sz="1000" dirty="0" smtClean="0">
+                <a:solidFill>
+                  <a:prstClr val="white"/>
+                </a:solidFill>
+              </a:rPr>
+              <a:t> </a:t>
+            </a:r>
+            <a:r>
+              <a:rPr lang="en-US" sz="1000" dirty="0" err="1" smtClean="0">
+                <a:solidFill>
+                  <a:prstClr val="white"/>
+                </a:solidFill>
+              </a:rPr>
+              <a:t>colspan</a:t>
+            </a:r>
+            <a:r>
+              <a:rPr lang="en-US" sz="1000" dirty="0" smtClean="0">
+                <a:solidFill>
+                  <a:prstClr val="white"/>
+                </a:solidFill>
+              </a:rPr>
+              <a:t>=2&gt;&lt;strong&gt;COMPUTER INFORMATION:&lt;/strong&gt;&lt;/</a:t>
+            </a:r>
+            <a:r>
+              <a:rPr lang="en-US" sz="1000" dirty="0" err="1" smtClean="0">
+                <a:solidFill>
+                  <a:prstClr val="white"/>
+                </a:solidFill>
+              </a:rPr>
+              <a:t>th</a:t>
+            </a:r>
+            <a:r>
+              <a:rPr lang="en-US" sz="1000" dirty="0" smtClean="0">
+                <a:solidFill>
+                  <a:prstClr val="white"/>
+                </a:solidFill>
+              </a:rPr>
+              <a:t>&gt;</a:t>
+            </a:r>
+          </a:p>
+        </p:txBody>
+      </p:sp>
+    </p:spTree>
+    <p:extLst>
+      <p:ext uri="{BB962C8B-B14F-4D97-AF65-F5344CB8AC3E}">
+        <p14:creationId xmlns:p14="http://schemas.microsoft.com/office/powerpoint/2010/main" val="158509741"/>
+      </p:ext>
+    </p:extLst>
+  </p:cSld>
+  <p:clrMapOvr>
+    <a:masterClrMapping/>
+  </p:clrMapOvr>
+  <p:timing>
+    <p:tnLst>
+      <p:par>
+        <p:cTn id="1" dur="indefinite" restart="never" nodeType="tmRoot"/>
+      </p:par>
+    </p:tnLst>
+  </p:timing>
+</p:sld>
+</file>
+
+<file path=ppt/slides/slide7.xml><?xml version="1.0" encoding="utf-8"?>
+<p:sld xmlns:a="http://schemas.openxmlformats.org/drawingml/2006/main" xmlns:r="http://schemas.openxmlformats.org/officeDocument/2006/relationships" xmlns:p="http://schemas.openxmlformats.org/presentationml/2006/main">
+  <p:cSld>
+    <p:spTree>
+      <p:nvGrpSpPr>
+        <p:cNvPr id="1" name=""/>
+        <p:cNvGrpSpPr/>
+        <p:nvPr/>
+      </p:nvGrpSpPr>
+      <p:grpSpPr>
+        <a:xfrm>
+          <a:off x="0" y="0"/>
+          <a:ext cx="0" cy="0"/>
+          <a:chOff x="0" y="0"/>
+          <a:chExt cx="0" cy="0"/>
+        </a:xfrm>
+      </p:grpSpPr>
+      <p:pic>
+        <p:nvPicPr>
+          <p:cNvPr id="5122" name="Picture 2"/>
+          <p:cNvPicPr>
+            <a:picLocks noChangeAspect="1" noChangeArrowheads="1"/>
+          </p:cNvPicPr>
+          <p:nvPr/>
+        </p:nvPicPr>
+        <p:blipFill>
+          <a:blip r:embed="rId2">
+            <a:extLst>
+              <a:ext uri="{28A0092B-C50C-407E-A947-70E740481C1C}">
+                <a14:useLocalDpi xmlns:a14="http://schemas.microsoft.com/office/drawing/2010/main" val="0"/>
+              </a:ext>
+            </a:extLst>
+          </a:blip>
+          <a:srcRect/>
+          <a:stretch>
+            <a:fillRect/>
+          </a:stretch>
+        </p:blipFill>
+        <p:spPr bwMode="auto">
+          <a:xfrm>
+            <a:off x="1447800" y="152400"/>
+            <a:ext cx="5867400" cy="6629400"/>
+          </a:xfrm>
+          <a:prstGeom prst="rect">
+            <a:avLst/>
+          </a:prstGeom>
+          <a:noFill/>
+          <a:ln>
+            <a:noFill/>
+          </a:ln>
+          <a:extLst>
+            <a:ext uri="{909E8E84-426E-40DD-AFC4-6F175D3DCCD1}">
+              <a14:hiddenFill xmlns:a14="http://schemas.microsoft.com/office/drawing/2010/main">
+                <a:solidFill>
+                  <a:schemeClr val="accent1"/>
+                </a:solidFill>
+              </a14:hiddenFill>
+            </a:ext>
+            <a:ext uri="{91240B29-F687-4F45-9708-019B960494DF}">
+              <a14:hiddenLine xmlns:a14="http://schemas.microsoft.com/office/drawing/2010/main" w="9525">
+                <a:solidFill>
+                  <a:schemeClr val="tx1"/>
+                </a:solidFill>
+                <a:miter lim="800000"/>
+                <a:headEnd/>
+                <a:tailEnd/>
+              </a14:hiddenLine>
+            </a:ext>
+          </a:extLst>
+        </p:spPr>
+      </p:pic>
+    </p:spTree>
+    <p:extLst>
+      <p:ext uri="{BB962C8B-B14F-4D97-AF65-F5344CB8AC3E}">
+        <p14:creationId xmlns:p14="http://schemas.microsoft.com/office/powerpoint/2010/main" val="3081221796"/>
+      </p:ext>
+    </p:extLst>
+  </p:cSld>
+  <p:clrMapOvr>
+    <a:masterClrMapping/>
+  </p:clrMapOvr>
+  <p:timing>
+    <p:tnLst>
+      <p:par>
+        <p:cTn id="1" dur="indefinite" restart="never" nodeType="tmRoot"/>
+      </p:par>
+    </p:tnLst>
+  </p:timing>
+</p:sld>
+</file>
+
+<file path=ppt/slides/slide8.xml><?xml version="1.0" encoding="utf-8"?>
+<p:sld xmlns:a="http://schemas.openxmlformats.org/drawingml/2006/main" xmlns:r="http://schemas.openxmlformats.org/officeDocument/2006/relationships" xmlns:p="http://schemas.openxmlformats.org/presentationml/2006/main">
+  <p:cSld>
+    <p:spTree>
+      <p:nvGrpSpPr>
+        <p:cNvPr id="1" name=""/>
+        <p:cNvGrpSpPr/>
+        <p:nvPr/>
+      </p:nvGrpSpPr>
+      <p:grpSpPr>
+        <a:xfrm>
+          <a:off x="0" y="0"/>
+          <a:ext cx="0" cy="0"/>
+          <a:chOff x="0" y="0"/>
+          <a:chExt cx="0" cy="0"/>
+        </a:xfrm>
+      </p:grpSpPr>
+      <p:sp>
+        <p:nvSpPr>
+          <p:cNvPr id="2" name="Title 1"/>
+          <p:cNvSpPr>
+            <a:spLocks noGrp="1"/>
+          </p:cNvSpPr>
+          <p:nvPr>
+            <p:ph type="title"/>
+          </p:nvPr>
+        </p:nvSpPr>
+        <p:spPr/>
+        <p:txBody>
+          <a:bodyPr/>
+          <a:lstStyle/>
+          <a:p>
+            <a:r>
+              <a:rPr lang="en-US" dirty="0" smtClean="0"/>
+              <a:t>NOTHING</a:t>
+            </a:r>
+            <a:endParaRPr lang="en-US" dirty="0"/>
+          </a:p>
+        </p:txBody>
+      </p:sp>
+      <p:pic>
+        <p:nvPicPr>
+          <p:cNvPr id="6" name="gooddaysir.mp3">
+            <a:hlinkClick r:id="" action="ppaction://media"/>
+          </p:cNvPr>
+          <p:cNvPicPr>
+            <a:picLocks noGrp="1" noChangeAspect="1"/>
+          </p:cNvPicPr>
+          <p:nvPr>
+            <p:ph idx="1"/>
+            <a:audioFile r:link="rId2"/>
+            <p:extLst>
+              <p:ext uri="{DAA4B4D4-6D71-4841-9C94-3DE7FCFB9230}">
+                <p14:media xmlns:p14="http://schemas.microsoft.com/office/powerpoint/2010/main" r:embed="rId1"/>
+              </p:ext>
+            </p:extLst>
+          </p:nvPr>
+        </p:nvPicPr>
+        <p:blipFill>
+          <a:blip r:embed="rId4"/>
+          <a:stretch>
+            <a:fillRect/>
+          </a:stretch>
+        </p:blipFill>
+        <p:spPr>
+          <a:xfrm>
+            <a:off x="4267200" y="3557588"/>
+            <a:ext cx="609600" cy="609600"/>
+          </a:xfrm>
+        </p:spPr>
+      </p:pic>
+    </p:spTree>
+    <p:extLst>
+      <p:ext uri="{BB962C8B-B14F-4D97-AF65-F5344CB8AC3E}">
+        <p14:creationId xmlns:p14="http://schemas.microsoft.com/office/powerpoint/2010/main" val="1985748534"/>
+      </p:ext>
+    </p:extLst>
+  </p:cSld>
+  <p:clrMapOvr>
+    <a:masterClrMapping/>
+  </p:clrMapOvr>
+  <p:timing>
+    <p:tnLst>
+      <p:par>
+        <p:cTn id="1" dur="indefinite" restart="never" nodeType="tmRoot">
+          <p:childTnLst>
+            <p:seq concurrent="1" nextAc="seek">
+              <p:cTn id="2" restart="whenNotActive" fill="hold" evtFilter="cancelBubble" nodeType="interactiveSeq">
+                <p:stCondLst>
+                  <p:cond evt="onClick" delay="0">
+                    <p:tgtEl>
+                      <p:spTgt spid="6"/>
+                    </p:tgtEl>
+                  </p:cond>
+                </p:stCondLst>
+                <p:endSync evt="end" delay="0">
+                  <p:rtn val="all"/>
+                </p:endSync>
+                <p:childTnLst>
+                  <p:par>
+                    <p:cTn id="3" fill="hold">
+                      <p:stCondLst>
+                        <p:cond delay="0"/>
+                      </p:stCondLst>
+                      <p:childTnLst>
+                        <p:par>
+                          <p:cTn id="4" fill="hold">
+                            <p:stCondLst>
+                              <p:cond delay="0"/>
+                            </p:stCondLst>
+                            <p:childTnLst>
+                              <p:par>
+                                <p:cTn id="5" presetID="1" presetClass="mediacall" presetSubtype="0" fill="hold" nodeType="clickEffect">
+                                  <p:stCondLst>
+                                    <p:cond delay="0"/>
+                                  </p:stCondLst>
+                                  <p:childTnLst>
+                                    <p:cmd type="call" cmd="playFrom(0.0)">
+                                      <p:cBhvr>
+                                        <p:cTn id="6" dur="5746" fill="hold"/>
+                                        <p:tgtEl>
+                                          <p:spTgt spid="6"/>
+                                        </p:tgtEl>
+                                      </p:cBhvr>
+                                    </p:cmd>
+                                  </p:childTnLst>
+                                </p:cTn>
+                              </p:par>
+                            </p:childTnLst>
+                          </p:cTn>
+                        </p:par>
+                      </p:childTnLst>
+                    </p:cTn>
+                  </p:par>
+                </p:childTnLst>
+              </p:cTn>
+              <p:nextCondLst>
+                <p:cond evt="onClick" delay="0">
+                  <p:tgtEl>
+                    <p:spTgt spid="6"/>
+                  </p:tgtEl>
+                </p:cond>
+              </p:nextCondLst>
+            </p:seq>
+            <p:audio>
+              <p:cMediaNode vol="80000">
+                <p:cTn id="7" fill="hold" display="0">
+                  <p:stCondLst>
+                    <p:cond delay="indefinite"/>
+                  </p:stCondLst>
+                  <p:endCondLst>
+                    <p:cond evt="onStopAudio" delay="0">
+                      <p:tgtEl>
+                        <p:sldTgt/>
+                      </p:tgtEl>
+                    </p:cond>
+                  </p:endCondLst>
+                </p:cTn>
+                <p:tgtEl>
+                  <p:spTgt spid="6"/>
+                </p:tgtEl>
+              </p:cMediaNode>
+            </p:audio>
+          </p:childTnLst>
+        </p:cTn>
+      </p:par>
+    </p:tnLst>
+  </p:timing>
+</p:sld>
+</file>
+
+<file path=ppt/slides/slide9.xml><?xml version="1.0" encoding="utf-8"?>
+<p:sld xmlns:a="http://schemas.openxmlformats.org/drawingml/2006/main" xmlns:r="http://schemas.openxmlformats.org/officeDocument/2006/relationships" xmlns:p="http://schemas.openxmlformats.org/presentationml/2006/main">
+  <p:cSld>
+    <p:spTree>
+      <p:nvGrpSpPr>
+        <p:cNvPr id="1" name=""/>
+        <p:cNvGrpSpPr/>
+        <p:nvPr/>
+      </p:nvGrpSpPr>
+      <p:grpSpPr>
+        <a:xfrm>
+          <a:off x="0" y="0"/>
+          <a:ext cx="0" cy="0"/>
+          <a:chOff x="0" y="0"/>
+          <a:chExt cx="0" cy="0"/>
+        </a:xfrm>
+      </p:grpSpPr>
+      <p:pic>
+        <p:nvPicPr>
           <p:cNvPr id="1027" name="Picture 3" descr="C:\Users\jortiz\AppData\Local\Microsoft\Windows\Temporary Internet Files\Content.IE5\64171VTY\MP900422224[1].jpg"/>
           <p:cNvPicPr>
             <a:picLocks noChangeAspect="1" noChangeArrowheads="1"/>
@@ -10172,434 +13608,6 @@
     <p:extLst>
       <p:ext uri="{BB962C8B-B14F-4D97-AF65-F5344CB8AC3E}">
         <p14:creationId xmlns:p14="http://schemas.microsoft.com/office/powerpoint/2010/main" val="1349394707"/>
-      </p:ext>
-    </p:extLst>
-  </p:cSld>
-  <p:clrMapOvr>
-    <a:masterClrMapping/>
-  </p:clrMapOvr>
-</p:sld>
-</file>
-
-<file path=ppt/slides/slide6.xml><?xml version="1.0" encoding="utf-8"?>
-<p:sld xmlns:a="http://schemas.openxmlformats.org/drawingml/2006/main" xmlns:r="http://schemas.openxmlformats.org/officeDocument/2006/relationships" xmlns:p="http://schemas.openxmlformats.org/presentationml/2006/main">
-  <p:cSld>
-    <p:spTree>
-      <p:nvGrpSpPr>
-        <p:cNvPr id="1" name=""/>
-        <p:cNvGrpSpPr/>
-        <p:nvPr/>
-      </p:nvGrpSpPr>
-      <p:grpSpPr>
-        <a:xfrm>
-          <a:off x="0" y="0"/>
-          <a:ext cx="0" cy="0"/>
-          <a:chOff x="0" y="0"/>
-          <a:chExt cx="0" cy="0"/>
-        </a:xfrm>
-      </p:grpSpPr>
-      <p:sp>
-        <p:nvSpPr>
-          <p:cNvPr id="2" name="TextBox 1"/>
-          <p:cNvSpPr txBox="1"/>
-          <p:nvPr/>
-        </p:nvSpPr>
-        <p:spPr>
-          <a:xfrm>
-            <a:off x="631371" y="6019800"/>
-            <a:ext cx="8097666" cy="646331"/>
-          </a:xfrm>
-          <a:prstGeom prst="rect">
-            <a:avLst/>
-          </a:prstGeom>
-          <a:noFill/>
-        </p:spPr>
-        <p:txBody>
-          <a:bodyPr wrap="none" rtlCol="0">
-            <a:spAutoFit/>
-          </a:bodyPr>
-          <a:lstStyle/>
-          <a:p>
-            <a:pPr marL="342900" indent="-342900">
-              <a:buFont typeface="+mj-lt"/>
-              <a:buAutoNum type="arabicPeriod"/>
-            </a:pPr>
-            <a:r>
-              <a:rPr lang="en-US" dirty="0"/>
-              <a:t>http://developer.zendesk.com/documentation/apps/migration/introduction.html</a:t>
-            </a:r>
-          </a:p>
-          <a:p>
-            <a:pPr marL="342900" indent="-342900">
-              <a:buFont typeface="+mj-lt"/>
-              <a:buAutoNum type="arabicPeriod"/>
-            </a:pPr>
-            <a:r>
-              <a:rPr lang="en-US" dirty="0" smtClean="0"/>
-              <a:t>http</a:t>
-            </a:r>
-            <a:r>
-              <a:rPr lang="en-US" dirty="0"/>
-              <a:t>://developer.zendesk.com/documentation/apps/</a:t>
-            </a:r>
-          </a:p>
-        </p:txBody>
-      </p:sp>
-      <p:pic>
-        <p:nvPicPr>
-          <p:cNvPr id="2050" name="Picture 2" descr="C:\Users\jortiz\AppData\Local\Microsoft\Windows\Temporary Internet Files\Content.IE5\JUTGQLI2\MP900399580[1].jpg"/>
-          <p:cNvPicPr>
-            <a:picLocks noChangeAspect="1" noChangeArrowheads="1"/>
-          </p:cNvPicPr>
-          <p:nvPr/>
-        </p:nvPicPr>
-        <p:blipFill>
-          <a:blip r:embed="rId2">
-            <a:extLst>
-              <a:ext uri="{28A0092B-C50C-407E-A947-70E740481C1C}">
-                <a14:useLocalDpi xmlns:a14="http://schemas.microsoft.com/office/drawing/2010/main" val="0"/>
-              </a:ext>
-            </a:extLst>
-          </a:blip>
-          <a:srcRect/>
-          <a:stretch>
-            <a:fillRect/>
-          </a:stretch>
-        </p:blipFill>
-        <p:spPr bwMode="auto">
-          <a:xfrm>
-            <a:off x="2362200" y="609600"/>
-            <a:ext cx="4094162" cy="5119001"/>
-          </a:xfrm>
-          <a:prstGeom prst="rect">
-            <a:avLst/>
-          </a:prstGeom>
-          <a:noFill/>
-          <a:extLst>
-            <a:ext uri="{909E8E84-426E-40DD-AFC4-6F175D3DCCD1}">
-              <a14:hiddenFill xmlns:a14="http://schemas.microsoft.com/office/drawing/2010/main">
-                <a:solidFill>
-                  <a:srgbClr val="FFFFFF"/>
-                </a:solidFill>
-              </a14:hiddenFill>
-            </a:ext>
-          </a:extLst>
-        </p:spPr>
-      </p:pic>
-    </p:spTree>
-    <p:extLst>
-      <p:ext uri="{BB962C8B-B14F-4D97-AF65-F5344CB8AC3E}">
-        <p14:creationId xmlns:p14="http://schemas.microsoft.com/office/powerpoint/2010/main" val="2701134517"/>
-      </p:ext>
-    </p:extLst>
-  </p:cSld>
-  <p:clrMapOvr>
-    <a:masterClrMapping/>
-  </p:clrMapOvr>
-</p:sld>
-</file>
-
-<file path=ppt/slides/slide7.xml><?xml version="1.0" encoding="utf-8"?>
-<p:sld xmlns:a="http://schemas.openxmlformats.org/drawingml/2006/main" xmlns:r="http://schemas.openxmlformats.org/officeDocument/2006/relationships" xmlns:p="http://schemas.openxmlformats.org/presentationml/2006/main">
-  <p:cSld>
-    <p:spTree>
-      <p:nvGrpSpPr>
-        <p:cNvPr id="1" name=""/>
-        <p:cNvGrpSpPr/>
-        <p:nvPr/>
-      </p:nvGrpSpPr>
-      <p:grpSpPr>
-        <a:xfrm>
-          <a:off x="0" y="0"/>
-          <a:ext cx="0" cy="0"/>
-          <a:chOff x="0" y="0"/>
-          <a:chExt cx="0" cy="0"/>
-        </a:xfrm>
-      </p:grpSpPr>
-      <p:pic>
-        <p:nvPicPr>
-          <p:cNvPr id="3075" name="Picture 3"/>
-          <p:cNvPicPr>
-            <a:picLocks noChangeAspect="1" noChangeArrowheads="1"/>
-          </p:cNvPicPr>
-          <p:nvPr/>
-        </p:nvPicPr>
-        <p:blipFill>
-          <a:blip r:embed="rId2">
-            <a:extLst>
-              <a:ext uri="{28A0092B-C50C-407E-A947-70E740481C1C}">
-                <a14:useLocalDpi xmlns:a14="http://schemas.microsoft.com/office/drawing/2010/main" val="0"/>
-              </a:ext>
-            </a:extLst>
-          </a:blip>
-          <a:srcRect/>
-          <a:stretch>
-            <a:fillRect/>
-          </a:stretch>
-        </p:blipFill>
-        <p:spPr bwMode="auto">
-          <a:xfrm>
-            <a:off x="147862" y="1371600"/>
-            <a:ext cx="8824913" cy="3327400"/>
-          </a:xfrm>
-          <a:prstGeom prst="rect">
-            <a:avLst/>
-          </a:prstGeom>
-          <a:ln/>
-        </p:spPr>
-        <p:style>
-          <a:lnRef idx="1">
-            <a:schemeClr val="accent3"/>
-          </a:lnRef>
-          <a:fillRef idx="2">
-            <a:schemeClr val="accent3"/>
-          </a:fillRef>
-          <a:effectRef idx="1">
-            <a:schemeClr val="accent3"/>
-          </a:effectRef>
-          <a:fontRef idx="minor">
-            <a:schemeClr val="dk1"/>
-          </a:fontRef>
-        </p:style>
-      </p:pic>
-    </p:spTree>
-    <p:extLst>
-      <p:ext uri="{BB962C8B-B14F-4D97-AF65-F5344CB8AC3E}">
-        <p14:creationId xmlns:p14="http://schemas.microsoft.com/office/powerpoint/2010/main" val="1790645398"/>
-      </p:ext>
-    </p:extLst>
-  </p:cSld>
-  <p:clrMapOvr>
-    <a:masterClrMapping/>
-  </p:clrMapOvr>
-  <p:timing>
-    <p:tnLst>
-      <p:par>
-        <p:cTn id="1" dur="indefinite" restart="never" nodeType="tmRoot"/>
-      </p:par>
-    </p:tnLst>
-  </p:timing>
-</p:sld>
-</file>
-
-<file path=ppt/slides/slide8.xml><?xml version="1.0" encoding="utf-8"?>
-<p:sld xmlns:a="http://schemas.openxmlformats.org/drawingml/2006/main" xmlns:r="http://schemas.openxmlformats.org/officeDocument/2006/relationships" xmlns:p="http://schemas.openxmlformats.org/presentationml/2006/main">
-  <p:cSld>
-    <p:spTree>
-      <p:nvGrpSpPr>
-        <p:cNvPr id="1" name=""/>
-        <p:cNvGrpSpPr/>
-        <p:nvPr/>
-      </p:nvGrpSpPr>
-      <p:grpSpPr>
-        <a:xfrm>
-          <a:off x="0" y="0"/>
-          <a:ext cx="0" cy="0"/>
-          <a:chOff x="0" y="0"/>
-          <a:chExt cx="0" cy="0"/>
-        </a:xfrm>
-      </p:grpSpPr>
-      <p:pic>
-        <p:nvPicPr>
-          <p:cNvPr id="4098" name="Picture 2"/>
-          <p:cNvPicPr>
-            <a:picLocks noChangeAspect="1" noChangeArrowheads="1"/>
-          </p:cNvPicPr>
-          <p:nvPr/>
-        </p:nvPicPr>
-        <p:blipFill>
-          <a:blip r:embed="rId2">
-            <a:extLst>
-              <a:ext uri="{28A0092B-C50C-407E-A947-70E740481C1C}">
-                <a14:useLocalDpi xmlns:a14="http://schemas.microsoft.com/office/drawing/2010/main" val="0"/>
-              </a:ext>
-            </a:extLst>
-          </a:blip>
-          <a:srcRect/>
-          <a:stretch>
-            <a:fillRect/>
-          </a:stretch>
-        </p:blipFill>
-        <p:spPr bwMode="auto">
-          <a:xfrm>
-            <a:off x="550636" y="859971"/>
-            <a:ext cx="7910513" cy="1816100"/>
-          </a:xfrm>
-          <a:prstGeom prst="rect">
-            <a:avLst/>
-          </a:prstGeom>
-          <a:ln/>
-        </p:spPr>
-        <p:style>
-          <a:lnRef idx="3">
-            <a:schemeClr val="lt1"/>
-          </a:lnRef>
-          <a:fillRef idx="1">
-            <a:schemeClr val="accent5"/>
-          </a:fillRef>
-          <a:effectRef idx="1">
-            <a:schemeClr val="accent5"/>
-          </a:effectRef>
-          <a:fontRef idx="minor">
-            <a:schemeClr val="lt1"/>
-          </a:fontRef>
-        </p:style>
-      </p:pic>
-      <p:sp>
-        <p:nvSpPr>
-          <p:cNvPr id="4" name="TextBox 3"/>
-          <p:cNvSpPr txBox="1"/>
-          <p:nvPr/>
-        </p:nvSpPr>
-        <p:spPr>
-          <a:xfrm>
-            <a:off x="550636" y="2306739"/>
-            <a:ext cx="7086600" cy="369332"/>
-          </a:xfrm>
-          <a:prstGeom prst="rect">
-            <a:avLst/>
-          </a:prstGeom>
-          <a:noFill/>
-        </p:spPr>
-        <p:txBody>
-          <a:bodyPr wrap="square" rtlCol="0">
-            <a:spAutoFit/>
-          </a:bodyPr>
-          <a:lstStyle/>
-          <a:p>
-            <a:r>
-              <a:rPr lang="en-US" dirty="0" smtClean="0"/>
-              <a:t>Inside of templates folder</a:t>
-            </a:r>
-            <a:endParaRPr lang="en-US" dirty="0"/>
-          </a:p>
-        </p:txBody>
-      </p:sp>
-    </p:spTree>
-    <p:extLst>
-      <p:ext uri="{BB962C8B-B14F-4D97-AF65-F5344CB8AC3E}">
-        <p14:creationId xmlns:p14="http://schemas.microsoft.com/office/powerpoint/2010/main" val="1311630102"/>
-      </p:ext>
-    </p:extLst>
-  </p:cSld>
-  <p:clrMapOvr>
-    <a:masterClrMapping/>
-  </p:clrMapOvr>
-  <p:timing>
-    <p:tnLst>
-      <p:par>
-        <p:cTn id="1" dur="indefinite" restart="never" nodeType="tmRoot"/>
-      </p:par>
-    </p:tnLst>
-  </p:timing>
-</p:sld>
-</file>
-
-<file path=ppt/slides/slide9.xml><?xml version="1.0" encoding="utf-8"?>
-<p:sld xmlns:a="http://schemas.openxmlformats.org/drawingml/2006/main" xmlns:r="http://schemas.openxmlformats.org/officeDocument/2006/relationships" xmlns:p="http://schemas.openxmlformats.org/presentationml/2006/main">
-  <p:cSld>
-    <p:spTree>
-      <p:nvGrpSpPr>
-        <p:cNvPr id="1" name=""/>
-        <p:cNvGrpSpPr/>
-        <p:nvPr/>
-      </p:nvGrpSpPr>
-      <p:grpSpPr>
-        <a:xfrm>
-          <a:off x="0" y="0"/>
-          <a:ext cx="0" cy="0"/>
-          <a:chOff x="0" y="0"/>
-          <a:chExt cx="0" cy="0"/>
-        </a:xfrm>
-      </p:grpSpPr>
-      <p:pic>
-        <p:nvPicPr>
-          <p:cNvPr id="6146" name="Picture 2"/>
-          <p:cNvPicPr>
-            <a:picLocks noChangeAspect="1" noChangeArrowheads="1"/>
-          </p:cNvPicPr>
-          <p:nvPr/>
-        </p:nvPicPr>
-        <p:blipFill>
-          <a:blip r:embed="rId2">
-            <a:extLst>
-              <a:ext uri="{28A0092B-C50C-407E-A947-70E740481C1C}">
-                <a14:useLocalDpi xmlns:a14="http://schemas.microsoft.com/office/drawing/2010/main" val="0"/>
-              </a:ext>
-            </a:extLst>
-          </a:blip>
-          <a:srcRect/>
-          <a:stretch>
-            <a:fillRect/>
-          </a:stretch>
-        </p:blipFill>
-        <p:spPr bwMode="auto">
-          <a:xfrm>
-            <a:off x="431800" y="381000"/>
-            <a:ext cx="8278813" cy="3898900"/>
-          </a:xfrm>
-          <a:prstGeom prst="rect">
-            <a:avLst/>
-          </a:prstGeom>
-          <a:noFill/>
-          <a:ln>
-            <a:noFill/>
-          </a:ln>
-          <a:extLst>
-            <a:ext uri="{909E8E84-426E-40DD-AFC4-6F175D3DCCD1}">
-              <a14:hiddenFill xmlns:a14="http://schemas.microsoft.com/office/drawing/2010/main">
-                <a:solidFill>
-                  <a:schemeClr val="accent1"/>
-                </a:solidFill>
-              </a14:hiddenFill>
-            </a:ext>
-            <a:ext uri="{91240B29-F687-4F45-9708-019B960494DF}">
-              <a14:hiddenLine xmlns:a14="http://schemas.microsoft.com/office/drawing/2010/main" w="9525">
-                <a:solidFill>
-                  <a:schemeClr val="tx1"/>
-                </a:solidFill>
-                <a:miter lim="800000"/>
-                <a:headEnd/>
-                <a:tailEnd/>
-              </a14:hiddenLine>
-            </a:ext>
-          </a:extLst>
-        </p:spPr>
-      </p:pic>
-      <p:sp>
-        <p:nvSpPr>
-          <p:cNvPr id="2" name="TextBox 1"/>
-          <p:cNvSpPr txBox="1"/>
-          <p:nvPr/>
-        </p:nvSpPr>
-        <p:spPr>
-          <a:xfrm>
-            <a:off x="1219200" y="2743200"/>
-            <a:ext cx="4267200" cy="369332"/>
-          </a:xfrm>
-          <a:prstGeom prst="rect">
-            <a:avLst/>
-          </a:prstGeom>
-          <a:noFill/>
-        </p:spPr>
-        <p:txBody>
-          <a:bodyPr wrap="square" rtlCol="0">
-            <a:spAutoFit/>
-          </a:bodyPr>
-          <a:lstStyle/>
-          <a:p>
-            <a:r>
-              <a:rPr lang="en-US" dirty="0" smtClean="0"/>
-              <a:t>Inside the assets folder</a:t>
-            </a:r>
-            <a:endParaRPr lang="en-US" dirty="0"/>
-          </a:p>
-        </p:txBody>
-      </p:sp>
-    </p:spTree>
-    <p:extLst>
-      <p:ext uri="{BB962C8B-B14F-4D97-AF65-F5344CB8AC3E}">
-        <p14:creationId xmlns:p14="http://schemas.microsoft.com/office/powerpoint/2010/main" val="3318644273"/>
       </p:ext>
     </p:extLst>
   </p:cSld>

</xml_diff>